<commit_message>
demo notes and pptx
</commit_message>
<xml_diff>
--- a/docs/distributed_demo.pptx
+++ b/docs/distributed_demo.pptx
@@ -14,15 +14,15 @@
     <p:sldId id="256" r:id="rId3"/>
     <p:sldId id="265" r:id="rId4"/>
     <p:sldId id="277" r:id="rId5"/>
-    <p:sldId id="292" r:id="rId6"/>
-    <p:sldId id="293" r:id="rId7"/>
-    <p:sldId id="294" r:id="rId8"/>
-    <p:sldId id="295" r:id="rId9"/>
-    <p:sldId id="296" r:id="rId10"/>
-    <p:sldId id="297" r:id="rId11"/>
-    <p:sldId id="298" r:id="rId12"/>
-    <p:sldId id="299" r:id="rId13"/>
-    <p:sldId id="291" r:id="rId14"/>
+    <p:sldId id="300" r:id="rId6"/>
+    <p:sldId id="302" r:id="rId7"/>
+    <p:sldId id="301" r:id="rId8"/>
+    <p:sldId id="303" r:id="rId9"/>
+    <p:sldId id="304" r:id="rId10"/>
+    <p:sldId id="305" r:id="rId11"/>
+    <p:sldId id="307" r:id="rId12"/>
+    <p:sldId id="306" r:id="rId13"/>
+    <p:sldId id="308" r:id="rId14"/>
     <p:sldId id="289" r:id="rId15"/>
     <p:sldId id="288" r:id="rId16"/>
   </p:sldIdLst>
@@ -227,7 +227,7 @@
           <a:p>
             <a:fld id="{762B48F5-BACC-47D6-A0F7-82FBF9C6BC85}" type="datetimeFigureOut">
               <a:rPr lang="en-US"/>
-              <a:t>9/15/2013</a:t>
+              <a:t>9/22/2013</a:t>
             </a:fld>
             <a:endParaRPr/>
           </a:p>
@@ -392,7 +392,7 @@
           <a:p>
             <a:fld id="{0CB1CD00-5424-4675-AB18-2C419B060449}" type="datetimeFigureOut">
               <a:rPr lang="en-US"/>
-              <a:t>9/15/2013</a:t>
+              <a:t>9/22/2013</a:t>
             </a:fld>
             <a:endParaRPr/>
           </a:p>
@@ -817,7 +817,7 @@
     </p:spTree>
     <p:extLst>
       <p:ext uri="{BB962C8B-B14F-4D97-AF65-F5344CB8AC3E}">
-        <p14:creationId xmlns:p14="http://schemas.microsoft.com/office/powerpoint/2010/main" val="3583390664"/>
+        <p14:creationId xmlns:p14="http://schemas.microsoft.com/office/powerpoint/2010/main" val="3505351812"/>
       </p:ext>
     </p:extLst>
   </p:cSld>
@@ -901,7 +901,7 @@
     </p:spTree>
     <p:extLst>
       <p:ext uri="{BB962C8B-B14F-4D97-AF65-F5344CB8AC3E}">
-        <p14:creationId xmlns:p14="http://schemas.microsoft.com/office/powerpoint/2010/main" val="178069197"/>
+        <p14:creationId xmlns:p14="http://schemas.microsoft.com/office/powerpoint/2010/main" val="3547795329"/>
       </p:ext>
     </p:extLst>
   </p:cSld>
@@ -985,7 +985,7 @@
     </p:spTree>
     <p:extLst>
       <p:ext uri="{BB962C8B-B14F-4D97-AF65-F5344CB8AC3E}">
-        <p14:creationId xmlns:p14="http://schemas.microsoft.com/office/powerpoint/2010/main" val="3576590079"/>
+        <p14:creationId xmlns:p14="http://schemas.microsoft.com/office/powerpoint/2010/main" val="633569321"/>
       </p:ext>
     </p:extLst>
   </p:cSld>
@@ -1405,7 +1405,7 @@
     </p:spTree>
     <p:extLst>
       <p:ext uri="{BB962C8B-B14F-4D97-AF65-F5344CB8AC3E}">
-        <p14:creationId xmlns:p14="http://schemas.microsoft.com/office/powerpoint/2010/main" val="2050473629"/>
+        <p14:creationId xmlns:p14="http://schemas.microsoft.com/office/powerpoint/2010/main" val="2720063075"/>
       </p:ext>
     </p:extLst>
   </p:cSld>
@@ -1489,7 +1489,7 @@
     </p:spTree>
     <p:extLst>
       <p:ext uri="{BB962C8B-B14F-4D97-AF65-F5344CB8AC3E}">
-        <p14:creationId xmlns:p14="http://schemas.microsoft.com/office/powerpoint/2010/main" val="1974093301"/>
+        <p14:creationId xmlns:p14="http://schemas.microsoft.com/office/powerpoint/2010/main" val="2906824861"/>
       </p:ext>
     </p:extLst>
   </p:cSld>
@@ -1573,7 +1573,7 @@
     </p:spTree>
     <p:extLst>
       <p:ext uri="{BB962C8B-B14F-4D97-AF65-F5344CB8AC3E}">
-        <p14:creationId xmlns:p14="http://schemas.microsoft.com/office/powerpoint/2010/main" val="1515792907"/>
+        <p14:creationId xmlns:p14="http://schemas.microsoft.com/office/powerpoint/2010/main" val="1947115844"/>
       </p:ext>
     </p:extLst>
   </p:cSld>
@@ -1657,7 +1657,7 @@
     </p:spTree>
     <p:extLst>
       <p:ext uri="{BB962C8B-B14F-4D97-AF65-F5344CB8AC3E}">
-        <p14:creationId xmlns:p14="http://schemas.microsoft.com/office/powerpoint/2010/main" val="1683568875"/>
+        <p14:creationId xmlns:p14="http://schemas.microsoft.com/office/powerpoint/2010/main" val="2922175338"/>
       </p:ext>
     </p:extLst>
   </p:cSld>
@@ -1741,7 +1741,7 @@
     </p:spTree>
     <p:extLst>
       <p:ext uri="{BB962C8B-B14F-4D97-AF65-F5344CB8AC3E}">
-        <p14:creationId xmlns:p14="http://schemas.microsoft.com/office/powerpoint/2010/main" val="1171073715"/>
+        <p14:creationId xmlns:p14="http://schemas.microsoft.com/office/powerpoint/2010/main" val="2596978084"/>
       </p:ext>
     </p:extLst>
   </p:cSld>
@@ -1825,7 +1825,7 @@
     </p:spTree>
     <p:extLst>
       <p:ext uri="{BB962C8B-B14F-4D97-AF65-F5344CB8AC3E}">
-        <p14:creationId xmlns:p14="http://schemas.microsoft.com/office/powerpoint/2010/main" val="2688773789"/>
+        <p14:creationId xmlns:p14="http://schemas.microsoft.com/office/powerpoint/2010/main" val="3416275554"/>
       </p:ext>
     </p:extLst>
   </p:cSld>
@@ -2215,7 +2215,7 @@
           <a:p>
             <a:fld id="{37CC0096-1860-4642-9CD2-0079EA5E7CD1}" type="datetimeFigureOut">
               <a:rPr lang="en-US" smtClean="0"/>
-              <a:t>9/15/2013</a:t>
+              <a:t>9/22/2013</a:t>
             </a:fld>
             <a:endParaRPr lang="en-US"/>
           </a:p>
@@ -2410,7 +2410,7 @@
           <a:p>
             <a:fld id="{37CC0096-1860-4642-9CD2-0079EA5E7CD1}" type="datetimeFigureOut">
               <a:rPr lang="en-US" smtClean="0"/>
-              <a:t>9/15/2013</a:t>
+              <a:t>9/22/2013</a:t>
             </a:fld>
             <a:endParaRPr lang="en-US"/>
           </a:p>
@@ -2599,7 +2599,7 @@
           <a:p>
             <a:fld id="{37CC0096-1860-4642-9CD2-0079EA5E7CD1}" type="datetimeFigureOut">
               <a:rPr lang="en-US" smtClean="0"/>
-              <a:t>9/15/2013</a:t>
+              <a:t>9/22/2013</a:t>
             </a:fld>
             <a:endParaRPr lang="en-US"/>
           </a:p>
@@ -3064,7 +3064,7 @@
           <a:p>
             <a:fld id="{37CC0096-1860-4642-9CD2-0079EA5E7CD1}" type="datetimeFigureOut">
               <a:rPr lang="en-US" smtClean="0"/>
-              <a:t>9/15/2013</a:t>
+              <a:t>9/22/2013</a:t>
             </a:fld>
             <a:endParaRPr lang="en-US"/>
           </a:p>
@@ -3519,7 +3519,7 @@
           <a:p>
             <a:fld id="{37CC0096-1860-4642-9CD2-0079EA5E7CD1}" type="datetimeFigureOut">
               <a:rPr lang="en-US" smtClean="0"/>
-              <a:t>9/15/2013</a:t>
+              <a:t>9/22/2013</a:t>
             </a:fld>
             <a:endParaRPr lang="en-US"/>
           </a:p>
@@ -3652,7 +3652,7 @@
           <a:p>
             <a:fld id="{37CC0096-1860-4642-9CD2-0079EA5E7CD1}" type="datetimeFigureOut">
               <a:rPr lang="en-US" smtClean="0"/>
-              <a:t>9/15/2013</a:t>
+              <a:t>9/22/2013</a:t>
             </a:fld>
             <a:endParaRPr lang="en-US"/>
           </a:p>
@@ -3762,7 +3762,7 @@
           <a:p>
             <a:fld id="{37CC0096-1860-4642-9CD2-0079EA5E7CD1}" type="datetimeFigureOut">
               <a:rPr lang="en-US" smtClean="0"/>
-              <a:t>9/15/2013</a:t>
+              <a:t>9/22/2013</a:t>
             </a:fld>
             <a:endParaRPr lang="en-US"/>
           </a:p>
@@ -4061,7 +4061,7 @@
           <a:p>
             <a:fld id="{37CC0096-1860-4642-9CD2-0079EA5E7CD1}" type="datetimeFigureOut">
               <a:rPr lang="en-US" smtClean="0"/>
-              <a:t>9/15/2013</a:t>
+              <a:t>9/22/2013</a:t>
             </a:fld>
             <a:endParaRPr lang="en-US"/>
           </a:p>
@@ -4389,7 +4389,7 @@
           <a:p>
             <a:fld id="{37CC0096-1860-4642-9CD2-0079EA5E7CD1}" type="datetimeFigureOut">
               <a:rPr lang="en-US" smtClean="0"/>
-              <a:t>9/15/2013</a:t>
+              <a:t>9/22/2013</a:t>
             </a:fld>
             <a:endParaRPr lang="en-US"/>
           </a:p>
@@ -4618,7 +4618,7 @@
             <a:fld id="{37CC0096-1860-4642-9CD2-0079EA5E7CD1}" type="datetimeFigureOut">
               <a:rPr lang="en-US"/>
               <a:pPr/>
-              <a:t>9/15/2013</a:t>
+              <a:t>9/22/2013</a:t>
             </a:fld>
             <a:endParaRPr/>
           </a:p>
@@ -5105,7 +5105,7 @@
         <p:spPr>
           <a:xfrm>
             <a:off x="762000" y="3165763"/>
-            <a:ext cx="11125200" cy="1711037"/>
+            <a:ext cx="11125200" cy="1406237"/>
           </a:xfrm>
         </p:spPr>
         <p:txBody>
@@ -5116,7 +5116,7 @@
           <a:p>
             <a:r>
               <a:rPr lang="en-US" sz="6600" dirty="0" smtClean="0"/>
-              <a:t>DuoVia.Net.Distributed</a:t>
+              <a:t>To the TPL &amp; Beyond</a:t>
             </a:r>
             <a:endParaRPr sz="6600" dirty="0"/>
           </a:p>
@@ -5134,32 +5134,35 @@
         </p:nvSpPr>
         <p:spPr>
           <a:xfrm>
-            <a:off x="838200" y="4953000"/>
-            <a:ext cx="10820400" cy="685800"/>
+            <a:off x="838200" y="4648200"/>
+            <a:ext cx="10820400" cy="914400"/>
           </a:xfrm>
         </p:spPr>
         <p:txBody>
           <a:bodyPr>
-            <a:normAutofit/>
+            <a:noAutofit/>
           </a:bodyPr>
           <a:lstStyle/>
           <a:p>
             <a:r>
-              <a:rPr lang="en-US" sz="2800" dirty="0" smtClean="0"/>
-              <a:t>DTPL - Distributed </a:t>
-            </a:r>
-            <a:r>
-              <a:rPr lang="en-US" sz="2800" dirty="0"/>
-              <a:t>Task Parallel </a:t>
-            </a:r>
-            <a:r>
-              <a:rPr lang="en-US" sz="2800" dirty="0" smtClean="0"/>
-              <a:t>Library</a:t>
-            </a:r>
-            <a:endParaRPr lang="en-US" sz="2800" dirty="0"/>
-          </a:p>
-          <a:p>
-            <a:endParaRPr sz="2800" dirty="0"/>
+              <a:rPr lang="en-US" sz="3200" dirty="0" smtClean="0"/>
+              <a:t>Taking the Task </a:t>
+            </a:r>
+            <a:r>
+              <a:rPr lang="en-US" sz="3200" dirty="0"/>
+              <a:t>Parallel </a:t>
+            </a:r>
+            <a:r>
+              <a:rPr lang="en-US" sz="3200" dirty="0" smtClean="0"/>
+              <a:t>Library into </a:t>
+            </a:r>
+          </a:p>
+          <a:p>
+            <a:r>
+              <a:rPr lang="en-US" sz="3200" dirty="0" smtClean="0"/>
+              <a:t>             ...the Distributed Computing Zone</a:t>
+            </a:r>
+            <a:endParaRPr lang="en-US" sz="3200" dirty="0"/>
           </a:p>
         </p:txBody>
       </p:sp>
@@ -5239,11 +5242,11 @@
             </a:r>
             <a:r>
               <a:rPr lang="en-US" sz="4000" dirty="0" err="1" smtClean="0"/>
-              <a:t>.DoTheDemoAlready</a:t>
+              <a:t>.DoSprint</a:t>
             </a:r>
             <a:r>
               <a:rPr lang="en-US" sz="4000" dirty="0" smtClean="0"/>
-              <a:t>()</a:t>
+              <a:t>(4)</a:t>
             </a:r>
             <a:endParaRPr sz="4000" dirty="0"/>
           </a:p>
@@ -5259,59 +5262,92 @@
             <p:ph idx="1"/>
           </p:nvPr>
         </p:nvSpPr>
-        <p:spPr>
-          <a:xfrm>
-            <a:off x="1524000" y="1828800"/>
-            <a:ext cx="9982200" cy="4267200"/>
-          </a:xfrm>
-        </p:spPr>
+        <p:spPr/>
         <p:txBody>
           <a:bodyPr>
-            <a:normAutofit/>
+            <a:normAutofit fontScale="85000" lnSpcReduction="20000"/>
           </a:bodyPr>
           <a:lstStyle/>
           <a:p>
             <a:r>
               <a:rPr lang="en-US" sz="3600" dirty="0" smtClean="0"/>
-              <a:t>Open Visual Studio</a:t>
+              <a:t>As the CTO</a:t>
             </a:r>
           </a:p>
           <a:p>
             <a:r>
               <a:rPr lang="en-US" sz="3600" dirty="0" smtClean="0"/>
-              <a:t>Create a console app</a:t>
+              <a:t>I want the same performance data </a:t>
+            </a:r>
+          </a:p>
+          <a:p>
+            <a:pPr lvl="1"/>
+            <a:r>
+              <a:rPr lang="en-US" sz="3400" dirty="0" smtClean="0"/>
+              <a:t>From the following 6 regions</a:t>
+            </a:r>
+          </a:p>
+          <a:p>
+            <a:pPr lvl="2"/>
+            <a:r>
+              <a:rPr lang="en-US" sz="3300" b="1" dirty="0" smtClean="0">
+                <a:solidFill>
+                  <a:srgbClr val="00B0F0"/>
+                </a:solidFill>
+              </a:rPr>
+              <a:t>West US, East US, North Europe </a:t>
+            </a:r>
+          </a:p>
+          <a:p>
+            <a:pPr lvl="2"/>
+            <a:r>
+              <a:rPr lang="en-US" sz="3300" b="1" dirty="0" smtClean="0">
+                <a:solidFill>
+                  <a:srgbClr val="00B0F0"/>
+                </a:solidFill>
+              </a:rPr>
+              <a:t>West Europe, Southeast Asia, East Asia</a:t>
+            </a:r>
+            <a:endParaRPr lang="en-US" sz="3300" b="1" dirty="0" smtClean="0">
+              <a:solidFill>
+                <a:srgbClr val="00B0F0"/>
+              </a:solidFill>
+            </a:endParaRPr>
+          </a:p>
+          <a:p>
+            <a:pPr lvl="1"/>
+            <a:r>
+              <a:rPr lang="en-US" sz="3400" dirty="0" smtClean="0"/>
+              <a:t>At the same time throughout the day</a:t>
             </a:r>
           </a:p>
           <a:p>
             <a:r>
               <a:rPr lang="en-US" sz="3600" dirty="0" smtClean="0"/>
-              <a:t>Add an interface and class that implements it</a:t>
-            </a:r>
-          </a:p>
-          <a:p>
-            <a:r>
-              <a:rPr lang="en-US" sz="3600" dirty="0" smtClean="0"/>
-              <a:t>Install NuGet DuoVia.Net.Distributed</a:t>
-            </a:r>
-          </a:p>
-          <a:p>
-            <a:r>
-              <a:rPr lang="en-US" sz="3600" dirty="0" smtClean="0"/>
-              <a:t>Write a little code</a:t>
-            </a:r>
-          </a:p>
-          <a:p>
-            <a:r>
-              <a:rPr lang="en-US" sz="3600" dirty="0" smtClean="0"/>
-              <a:t>Run it</a:t>
-            </a:r>
+              <a:t>So that I can make some charts and graphs</a:t>
+            </a:r>
+          </a:p>
+          <a:p>
+            <a:pPr lvl="1"/>
+            <a:r>
+              <a:rPr lang="en-US" sz="3400" dirty="0" smtClean="0"/>
+              <a:t>That will wow the board, and</a:t>
+            </a:r>
+          </a:p>
+          <a:p>
+            <a:pPr lvl="1"/>
+            <a:r>
+              <a:rPr lang="en-US" sz="3400" dirty="0" smtClean="0"/>
+              <a:t>That will allow you to keep your job</a:t>
+            </a:r>
+            <a:endParaRPr lang="en-US" sz="3400" dirty="0"/>
           </a:p>
         </p:txBody>
       </p:sp>
     </p:spTree>
     <p:extLst>
       <p:ext uri="{BB962C8B-B14F-4D97-AF65-F5344CB8AC3E}">
-        <p14:creationId xmlns:p14="http://schemas.microsoft.com/office/powerpoint/2010/main" val="2621572413"/>
+        <p14:creationId xmlns:p14="http://schemas.microsoft.com/office/powerpoint/2010/main" val="4096094480"/>
       </p:ext>
     </p:extLst>
   </p:cSld>
@@ -5380,7 +5416,7 @@
             </a:r>
             <a:r>
               <a:rPr lang="en-US" sz="4000" dirty="0" err="1" smtClean="0"/>
-              <a:t>.DistributeIt</a:t>
+              <a:t>.OhCrapWhatNow</a:t>
             </a:r>
             <a:r>
               <a:rPr lang="en-US" sz="4000" dirty="0" smtClean="0"/>
@@ -5400,12 +5436,7 @@
             <p:ph idx="1"/>
           </p:nvPr>
         </p:nvSpPr>
-        <p:spPr>
-          <a:xfrm>
-            <a:off x="1524000" y="1828800"/>
-            <a:ext cx="9982200" cy="4267200"/>
-          </a:xfrm>
-        </p:spPr>
+        <p:spPr/>
         <p:txBody>
           <a:bodyPr>
             <a:normAutofit/>
@@ -5413,34 +5444,21 @@
           <a:lstStyle/>
           <a:p>
             <a:r>
-              <a:rPr lang="en-US" sz="3600" dirty="0" smtClean="0"/>
-              <a:t>May I have a volunteer?</a:t>
-            </a:r>
-          </a:p>
-          <a:p>
-            <a:r>
-              <a:rPr lang="en-US" sz="3600" dirty="0" smtClean="0"/>
-              <a:t>Write console host</a:t>
-            </a:r>
-          </a:p>
-          <a:p>
-            <a:r>
-              <a:rPr lang="en-US" sz="3600" dirty="0" smtClean="0"/>
-              <a:t>Open the port</a:t>
-            </a:r>
-          </a:p>
-          <a:p>
-            <a:r>
-              <a:rPr lang="en-US" sz="3600" dirty="0" smtClean="0"/>
-              <a:t>Run it</a:t>
-            </a:r>
+              <a:rPr lang="en-US" sz="3400" dirty="0" smtClean="0"/>
+              <a:t>Suggestions?</a:t>
+            </a:r>
+            <a:endParaRPr lang="en-US" sz="3200" dirty="0">
+              <a:solidFill>
+                <a:srgbClr val="00B0F0"/>
+              </a:solidFill>
+            </a:endParaRPr>
           </a:p>
         </p:txBody>
       </p:sp>
     </p:spTree>
     <p:extLst>
       <p:ext uri="{BB962C8B-B14F-4D97-AF65-F5344CB8AC3E}">
-        <p14:creationId xmlns:p14="http://schemas.microsoft.com/office/powerpoint/2010/main" val="4012571092"/>
+        <p14:creationId xmlns:p14="http://schemas.microsoft.com/office/powerpoint/2010/main" val="2992425123"/>
       </p:ext>
     </p:extLst>
   </p:cSld>
@@ -5495,7 +5513,7 @@
         <p:spPr/>
         <p:txBody>
           <a:bodyPr>
-            <a:noAutofit/>
+            <a:normAutofit/>
           </a:bodyPr>
           <a:lstStyle/>
           <a:p>
@@ -5509,11 +5527,19 @@
             </a:r>
             <a:r>
               <a:rPr lang="en-US" sz="4000" dirty="0" err="1" smtClean="0"/>
-              <a:t>.GetRoadmap</a:t>
+              <a:t>.GoTo</a:t>
             </a:r>
             <a:r>
               <a:rPr lang="en-US" sz="4000" dirty="0" smtClean="0"/>
-              <a:t>()</a:t>
+              <a:t>(</a:t>
+            </a:r>
+            <a:r>
+              <a:rPr lang="en-US" sz="4000" dirty="0" err="1" smtClean="0"/>
+              <a:t>VisualStudio</a:t>
+            </a:r>
+            <a:r>
+              <a:rPr lang="en-US" sz="4000" dirty="0" smtClean="0"/>
+              <a:t>)</a:t>
             </a:r>
             <a:endParaRPr sz="4000" dirty="0"/>
           </a:p>
@@ -5529,12 +5555,7 @@
             <p:ph idx="1"/>
           </p:nvPr>
         </p:nvSpPr>
-        <p:spPr>
-          <a:xfrm>
-            <a:off x="1524000" y="1828800"/>
-            <a:ext cx="9144000" cy="4495800"/>
-          </a:xfrm>
-        </p:spPr>
+        <p:spPr/>
         <p:txBody>
           <a:bodyPr>
             <a:normAutofit/>
@@ -5542,133 +5563,31 @@
           <a:lstStyle/>
           <a:p>
             <a:r>
-              <a:rPr lang="en-US" sz="3600" dirty="0" smtClean="0"/>
-              <a:t>Unit tests and demos</a:t>
-            </a:r>
-            <a:endParaRPr lang="en-US" sz="3600" dirty="0" smtClean="0"/>
-          </a:p>
-          <a:p>
-            <a:r>
-              <a:rPr lang="en-US" sz="3600" dirty="0" smtClean="0"/>
-              <a:t>SOLID-</a:t>
-            </a:r>
-            <a:r>
-              <a:rPr lang="en-US" sz="3600" dirty="0" err="1" smtClean="0"/>
-              <a:t>ify</a:t>
-            </a:r>
-            <a:endParaRPr lang="en-US" sz="3600" dirty="0" smtClean="0"/>
-          </a:p>
-          <a:p>
-            <a:r>
-              <a:rPr lang="en-US" sz="3600" dirty="0" smtClean="0"/>
-              <a:t>Support IOC for such as: </a:t>
-            </a:r>
-          </a:p>
-          <a:p>
-            <a:pPr lvl="1"/>
-            <a:r>
-              <a:rPr lang="en-US" sz="3200" dirty="0" smtClean="0"/>
-              <a:t>Communications – </a:t>
-            </a:r>
-            <a:r>
-              <a:rPr lang="en-US" sz="3200" dirty="0" err="1" smtClean="0"/>
-              <a:t>xMQ</a:t>
-            </a:r>
-            <a:r>
-              <a:rPr lang="en-US" sz="3200" dirty="0" smtClean="0"/>
-              <a:t>, etc.</a:t>
-            </a:r>
-          </a:p>
-          <a:p>
-            <a:pPr lvl="1"/>
-            <a:r>
-              <a:rPr lang="en-US" sz="3200" dirty="0" smtClean="0"/>
-              <a:t>Logging</a:t>
-            </a:r>
-            <a:endParaRPr lang="en-US" sz="3200" dirty="0" smtClean="0"/>
-          </a:p>
-          <a:p>
-            <a:r>
-              <a:rPr lang="en-US" sz="3600" dirty="0" smtClean="0"/>
-              <a:t>Documentation</a:t>
-            </a:r>
-            <a:endParaRPr lang="en-US" sz="3600" dirty="0" smtClean="0"/>
-          </a:p>
-        </p:txBody>
-      </p:sp>
-      <p:sp>
-        <p:nvSpPr>
-          <p:cNvPr id="2" name="TextBox 1"/>
-          <p:cNvSpPr txBox="1"/>
-          <p:nvPr/>
-        </p:nvSpPr>
-        <p:spPr>
-          <a:xfrm>
-            <a:off x="8534400" y="1228635"/>
-            <a:ext cx="3103735" cy="1200329"/>
-          </a:xfrm>
-          <a:prstGeom prst="rect">
-            <a:avLst/>
-          </a:prstGeom>
-          <a:solidFill>
-            <a:schemeClr val="accent2">
-              <a:lumMod val="20000"/>
-              <a:lumOff val="80000"/>
-            </a:schemeClr>
-          </a:solidFill>
-          <a:ln w="76200" cap="sq">
-            <a:solidFill>
-              <a:srgbClr val="FFFF00"/>
-            </a:solidFill>
-          </a:ln>
-        </p:spPr>
-        <p:txBody>
-          <a:bodyPr wrap="none" rtlCol="0">
-            <a:spAutoFit/>
-          </a:bodyPr>
-          <a:lstStyle/>
-          <a:p>
-            <a:r>
-              <a:rPr lang="en-US" sz="2400" b="1" dirty="0" smtClean="0">
+              <a:rPr lang="en-US" sz="3400" dirty="0" smtClean="0"/>
+              <a:t>Install-Package </a:t>
+            </a:r>
+            <a:r>
+              <a:rPr lang="en-US" sz="3400" dirty="0" err="1" smtClean="0"/>
+              <a:t>DuoVia.Net.Distributed</a:t>
+            </a:r>
+            <a:endParaRPr lang="en-US" sz="3400" dirty="0" smtClean="0"/>
+          </a:p>
+          <a:p>
+            <a:r>
+              <a:rPr lang="en-US" sz="3400" dirty="0" smtClean="0"/>
+              <a:t>Modify </a:t>
+            </a:r>
+            <a:r>
+              <a:rPr lang="en-US" sz="3200" dirty="0" err="1" smtClean="0">
                 <a:solidFill>
-                  <a:schemeClr val="bg1"/>
+                  <a:srgbClr val="00B0F0"/>
                 </a:solidFill>
               </a:rPr>
-              <a:t>True story. I just hit</a:t>
-            </a:r>
-            <a:br>
-              <a:rPr lang="en-US" sz="2400" b="1" dirty="0" smtClean="0">
-                <a:solidFill>
-                  <a:schemeClr val="bg1"/>
-                </a:solidFill>
-              </a:rPr>
-            </a:br>
-            <a:r>
-              <a:rPr lang="en-US" sz="2400" b="1" dirty="0" smtClean="0">
-                <a:solidFill>
-                  <a:schemeClr val="bg1"/>
-                </a:solidFill>
-              </a:rPr>
-              <a:t>Ctrl-Shift-B to compile</a:t>
-            </a:r>
-            <a:br>
-              <a:rPr lang="en-US" sz="2400" b="1" dirty="0" smtClean="0">
-                <a:solidFill>
-                  <a:schemeClr val="bg1"/>
-                </a:solidFill>
-              </a:rPr>
-            </a:br>
-            <a:r>
-              <a:rPr lang="en-US" sz="2400" b="1" dirty="0" smtClean="0">
-                <a:solidFill>
-                  <a:schemeClr val="bg1"/>
-                </a:solidFill>
-              </a:rPr>
-              <a:t>this presentation.</a:t>
-            </a:r>
-            <a:endParaRPr lang="en-US" sz="2400" b="1" dirty="0">
+              <a:t>Parallel.ForEach</a:t>
+            </a:r>
+            <a:endParaRPr lang="en-US" sz="3200" dirty="0">
               <a:solidFill>
-                <a:schemeClr val="bg1"/>
+                <a:srgbClr val="00B0F0"/>
               </a:solidFill>
             </a:endParaRPr>
           </a:p>
@@ -5677,175 +5596,27 @@
     </p:spTree>
     <p:extLst>
       <p:ext uri="{BB962C8B-B14F-4D97-AF65-F5344CB8AC3E}">
-        <p14:creationId xmlns:p14="http://schemas.microsoft.com/office/powerpoint/2010/main" val="943848345"/>
+        <p14:creationId xmlns:p14="http://schemas.microsoft.com/office/powerpoint/2010/main" val="664370044"/>
       </p:ext>
     </p:extLst>
   </p:cSld>
   <p:clrMapOvr>
     <a:masterClrMapping/>
   </p:clrMapOvr>
-  <mc:AlternateContent xmlns:mc="http://schemas.openxmlformats.org/markup-compatibility/2006" xmlns:p14="http://schemas.microsoft.com/office/powerpoint/2010/main">
-    <mc:Choice Requires="p14">
+  <mc:AlternateContent xmlns:mc="http://schemas.openxmlformats.org/markup-compatibility/2006">
+    <mc:Choice xmlns:p14="http://schemas.microsoft.com/office/powerpoint/2010/main" Requires="p14">
       <p:transition spd="slow" p14:dur="2000"/>
     </mc:Choice>
-    <mc:Fallback xmlns="">
+    <mc:Fallback>
       <p:transition spd="slow"/>
     </mc:Fallback>
   </mc:AlternateContent>
   <p:timing>
     <p:tnLst>
       <p:par>
-        <p:cTn id="1" dur="indefinite" restart="never" nodeType="tmRoot">
-          <p:childTnLst>
-            <p:seq concurrent="1" nextAc="seek">
-              <p:cTn id="2" dur="indefinite" nodeType="mainSeq">
-                <p:childTnLst>
-                  <p:par>
-                    <p:cTn id="3" fill="hold">
-                      <p:stCondLst>
-                        <p:cond delay="indefinite"/>
-                      </p:stCondLst>
-                      <p:childTnLst>
-                        <p:par>
-                          <p:cTn id="4" fill="hold">
-                            <p:stCondLst>
-                              <p:cond delay="0"/>
-                            </p:stCondLst>
-                            <p:childTnLst>
-                              <p:par>
-                                <p:cTn id="5" presetID="31" presetClass="entr" presetSubtype="0" fill="hold" grpId="0" nodeType="clickEffect">
-                                  <p:stCondLst>
-                                    <p:cond delay="0"/>
-                                  </p:stCondLst>
-                                  <p:childTnLst>
-                                    <p:set>
-                                      <p:cBhvr>
-                                        <p:cTn id="6" dur="1" fill="hold">
-                                          <p:stCondLst>
-                                            <p:cond delay="0"/>
-                                          </p:stCondLst>
-                                        </p:cTn>
-                                        <p:tgtEl>
-                                          <p:spTgt spid="2"/>
-                                        </p:tgtEl>
-                                        <p:attrNameLst>
-                                          <p:attrName>style.visibility</p:attrName>
-                                        </p:attrNameLst>
-                                      </p:cBhvr>
-                                      <p:to>
-                                        <p:strVal val="visible"/>
-                                      </p:to>
-                                    </p:set>
-                                    <p:anim calcmode="lin" valueType="num">
-                                      <p:cBhvr>
-                                        <p:cTn id="7" dur="1000" fill="hold"/>
-                                        <p:tgtEl>
-                                          <p:spTgt spid="2"/>
-                                        </p:tgtEl>
-                                        <p:attrNameLst>
-                                          <p:attrName>ppt_w</p:attrName>
-                                        </p:attrNameLst>
-                                      </p:cBhvr>
-                                      <p:tavLst>
-                                        <p:tav tm="0">
-                                          <p:val>
-                                            <p:fltVal val="0"/>
-                                          </p:val>
-                                        </p:tav>
-                                        <p:tav tm="100000">
-                                          <p:val>
-                                            <p:strVal val="#ppt_w"/>
-                                          </p:val>
-                                        </p:tav>
-                                      </p:tavLst>
-                                    </p:anim>
-                                    <p:anim calcmode="lin" valueType="num">
-                                      <p:cBhvr>
-                                        <p:cTn id="8" dur="1000" fill="hold"/>
-                                        <p:tgtEl>
-                                          <p:spTgt spid="2"/>
-                                        </p:tgtEl>
-                                        <p:attrNameLst>
-                                          <p:attrName>ppt_h</p:attrName>
-                                        </p:attrNameLst>
-                                      </p:cBhvr>
-                                      <p:tavLst>
-                                        <p:tav tm="0">
-                                          <p:val>
-                                            <p:fltVal val="0"/>
-                                          </p:val>
-                                        </p:tav>
-                                        <p:tav tm="100000">
-                                          <p:val>
-                                            <p:strVal val="#ppt_h"/>
-                                          </p:val>
-                                        </p:tav>
-                                      </p:tavLst>
-                                    </p:anim>
-                                    <p:anim calcmode="lin" valueType="num">
-                                      <p:cBhvr>
-                                        <p:cTn id="9" dur="1000" fill="hold"/>
-                                        <p:tgtEl>
-                                          <p:spTgt spid="2"/>
-                                        </p:tgtEl>
-                                        <p:attrNameLst>
-                                          <p:attrName>style.rotation</p:attrName>
-                                        </p:attrNameLst>
-                                      </p:cBhvr>
-                                      <p:tavLst>
-                                        <p:tav tm="0">
-                                          <p:val>
-                                            <p:fltVal val="90"/>
-                                          </p:val>
-                                        </p:tav>
-                                        <p:tav tm="100000">
-                                          <p:val>
-                                            <p:fltVal val="0"/>
-                                          </p:val>
-                                        </p:tav>
-                                      </p:tavLst>
-                                    </p:anim>
-                                    <p:animEffect transition="in" filter="fade">
-                                      <p:cBhvr>
-                                        <p:cTn id="10" dur="1000"/>
-                                        <p:tgtEl>
-                                          <p:spTgt spid="2"/>
-                                        </p:tgtEl>
-                                      </p:cBhvr>
-                                    </p:animEffect>
-                                  </p:childTnLst>
-                                </p:cTn>
-                              </p:par>
-                            </p:childTnLst>
-                          </p:cTn>
-                        </p:par>
-                      </p:childTnLst>
-                    </p:cTn>
-                  </p:par>
-                </p:childTnLst>
-              </p:cTn>
-              <p:prevCondLst>
-                <p:cond evt="onPrev" delay="0">
-                  <p:tgtEl>
-                    <p:sldTgt/>
-                  </p:tgtEl>
-                </p:cond>
-              </p:prevCondLst>
-              <p:nextCondLst>
-                <p:cond evt="onNext" delay="0">
-                  <p:tgtEl>
-                    <p:sldTgt/>
-                  </p:tgtEl>
-                </p:cond>
-              </p:nextCondLst>
-            </p:seq>
-          </p:childTnLst>
-        </p:cTn>
+        <p:cTn id="1" dur="indefinite" restart="never" nodeType="tmRoot"/>
       </p:par>
     </p:tnLst>
-    <p:bldLst>
-      <p:bldP spid="2" grpId="0" animBg="1"/>
-    </p:bldLst>
   </p:timing>
 </p:sld>
 </file>
@@ -5894,7 +5665,7 @@
             </a:r>
             <a:r>
               <a:rPr lang="en-US" sz="4000" dirty="0" err="1" smtClean="0"/>
-              <a:t>.DoCodeReview</a:t>
+              <a:t>.PeelTheOnion</a:t>
             </a:r>
             <a:r>
               <a:rPr lang="en-US" sz="4000" dirty="0" smtClean="0"/>
@@ -6269,7 +6040,6 @@
               <a:rPr lang="en-US" sz="3200" dirty="0" smtClean="0"/>
               <a:t>DuoVia.Net.Distributed</a:t>
             </a:r>
-            <a:endParaRPr lang="en-US" sz="3200" dirty="0" smtClean="0"/>
           </a:p>
           <a:p>
             <a:pPr lvl="1"/>
@@ -6289,7 +6059,6 @@
               <a:rPr lang="en-US" sz="2800" dirty="0" smtClean="0"/>
               <a:t>  </a:t>
             </a:r>
-            <a:endParaRPr lang="en-US" sz="2800" dirty="0" smtClean="0"/>
           </a:p>
           <a:p>
             <a:pPr lvl="1"/>
@@ -6376,7 +6145,7 @@
           <a:lstStyle/>
           <a:p>
             <a:r>
-              <a:rPr lang="en-US" sz="4000" dirty="0" smtClean="0">
+              <a:rPr lang="en-US" sz="4000" dirty="0" err="1" smtClean="0">
                 <a:solidFill>
                   <a:srgbClr val="00B0F0"/>
                 </a:solidFill>
@@ -6384,8 +6153,12 @@
               <a:t>this</a:t>
             </a:r>
             <a:r>
+              <a:rPr lang="en-US" sz="4000" dirty="0" err="1" smtClean="0"/>
+              <a:t>.IntroduceSelf</a:t>
+            </a:r>
+            <a:r>
               <a:rPr lang="en-US" sz="4000" dirty="0" smtClean="0"/>
-              <a:t>.Me()</a:t>
+              <a:t>()</a:t>
             </a:r>
             <a:endParaRPr sz="4000" dirty="0"/>
           </a:p>
@@ -6410,14 +6183,26 @@
           <a:p>
             <a:r>
               <a:rPr lang="en-US" sz="3200" dirty="0" smtClean="0"/>
-              <a:t>Tech Writer in 1992</a:t>
+              <a:t>Tech </a:t>
+            </a:r>
+            <a:r>
+              <a:rPr lang="en-US" sz="3200" dirty="0" smtClean="0"/>
+              <a:t>Writer, </a:t>
+            </a:r>
+            <a:r>
+              <a:rPr lang="en-US" sz="3200" dirty="0" smtClean="0"/>
+              <a:t>1992</a:t>
             </a:r>
             <a:endParaRPr lang="en-US" sz="3200" dirty="0"/>
           </a:p>
           <a:p>
             <a:r>
               <a:rPr lang="en-US" sz="3200" dirty="0" smtClean="0"/>
-              <a:t>ASP &amp; Delphi Dev in 1998</a:t>
+              <a:t>ASP &amp; </a:t>
+            </a:r>
+            <a:r>
+              <a:rPr lang="en-US" sz="3200" dirty="0" smtClean="0"/>
+              <a:t>Delphi, 1998</a:t>
             </a:r>
             <a:r>
               <a:rPr lang="en-US" sz="2400" dirty="0" smtClean="0"/>
@@ -6428,30 +6213,15 @@
           <a:p>
             <a:r>
               <a:rPr lang="en-US" sz="3200" dirty="0" smtClean="0"/>
-              <a:t>.</a:t>
-            </a:r>
+              <a:t>C# / .NET, 2001 (beta 2)</a:t>
+            </a:r>
+          </a:p>
+          <a:p>
             <a:r>
               <a:rPr lang="en-US" sz="3200" dirty="0" smtClean="0"/>
-              <a:t>NET </a:t>
-            </a:r>
-            <a:r>
-              <a:rPr lang="en-US" sz="3200" dirty="0" smtClean="0"/>
-              <a:t>since 2001</a:t>
-            </a:r>
-          </a:p>
-          <a:p>
-            <a:pPr lvl="1"/>
-            <a:r>
-              <a:rPr lang="en-US" sz="2400" dirty="0" smtClean="0"/>
-              <a:t>Ingenix and a few others</a:t>
-            </a:r>
-          </a:p>
-          <a:p>
-            <a:pPr lvl="1"/>
-            <a:r>
-              <a:rPr lang="en-US" sz="2400" dirty="0" smtClean="0"/>
-              <a:t>Ancestry.com since July 2012</a:t>
-            </a:r>
+              <a:t>Sr. Software Engineer, Ancestry.com</a:t>
+            </a:r>
+            <a:endParaRPr lang="en-US" sz="3200" dirty="0" smtClean="0"/>
           </a:p>
           <a:p>
             <a:r>
@@ -6482,7 +6252,60 @@
                 </a:solidFill>
                 <a:latin typeface="+mj-lt"/>
               </a:rPr>
-              <a:t>        “email”: “tyler@tsjensen.com” }”</a:t>
+              <a:t>        “email”: </a:t>
+            </a:r>
+            <a:r>
+              <a:rPr lang="en-US" sz="2800" dirty="0" smtClean="0">
+                <a:solidFill>
+                  <a:srgbClr val="00B0F0"/>
+                </a:solidFill>
+                <a:latin typeface="+mj-lt"/>
+              </a:rPr>
+              <a:t>“</a:t>
+            </a:r>
+            <a:r>
+              <a:rPr lang="en-US" sz="2800" dirty="0" err="1" smtClean="0">
+                <a:solidFill>
+                  <a:srgbClr val="00B0F0"/>
+                </a:solidFill>
+                <a:latin typeface="+mj-lt"/>
+              </a:rPr>
+              <a:t>tyler</a:t>
+            </a:r>
+            <a:r>
+              <a:rPr lang="en-US" sz="2800" dirty="0" smtClean="0">
+                <a:solidFill>
+                  <a:srgbClr val="00B0F0"/>
+                </a:solidFill>
+                <a:latin typeface="+mj-lt"/>
+              </a:rPr>
+              <a:t>[at]tsjensen.com”</a:t>
+            </a:r>
+            <a:br>
+              <a:rPr lang="en-US" sz="2800" dirty="0" smtClean="0">
+                <a:solidFill>
+                  <a:srgbClr val="00B0F0"/>
+                </a:solidFill>
+                <a:latin typeface="+mj-lt"/>
+              </a:rPr>
+            </a:br>
+            <a:r>
+              <a:rPr lang="en-US" sz="2800" dirty="0" smtClean="0">
+                <a:solidFill>
+                  <a:srgbClr val="00B0F0"/>
+                </a:solidFill>
+                <a:latin typeface="+mj-lt"/>
+              </a:rPr>
+              <a:t>        “blog”:  “www.tsjensen.com/blog” </a:t>
+            </a:r>
+            <a:r>
+              <a:rPr lang="en-US" sz="2800" dirty="0" smtClean="0">
+                <a:solidFill>
+                  <a:srgbClr val="00B0F0"/>
+                </a:solidFill>
+                <a:latin typeface="+mj-lt"/>
+              </a:rPr>
+              <a:t>}”</a:t>
             </a:r>
             <a:r>
               <a:rPr lang="en-US" sz="2800" dirty="0" smtClean="0"/>
@@ -6555,7 +6378,7 @@
           <a:lstStyle/>
           <a:p>
             <a:r>
-              <a:rPr lang="en-US" sz="4000" dirty="0" smtClean="0">
+              <a:rPr lang="en-US" sz="4000" dirty="0" err="1" smtClean="0">
                 <a:solidFill>
                   <a:srgbClr val="00B0F0"/>
                 </a:solidFill>
@@ -6563,8 +6386,12 @@
               <a:t>this</a:t>
             </a:r>
             <a:r>
+              <a:rPr lang="en-US" sz="4000" dirty="0" err="1" smtClean="0"/>
+              <a:t>.SetAgenda</a:t>
+            </a:r>
+            <a:r>
               <a:rPr lang="en-US" sz="4000" dirty="0" smtClean="0"/>
-              <a:t>.GetAgenda()</a:t>
+              <a:t>()</a:t>
             </a:r>
             <a:endParaRPr sz="4000" dirty="0"/>
           </a:p>
@@ -6589,38 +6416,33 @@
           <a:p>
             <a:r>
               <a:rPr lang="en-US" sz="3600" dirty="0" smtClean="0"/>
-              <a:t>TPL – What, </a:t>
-            </a:r>
+              <a:t>Sprint 1: Simple requirements</a:t>
+            </a:r>
+            <a:endParaRPr lang="en-US" sz="3600" dirty="0"/>
+          </a:p>
+          <a:p>
             <a:r>
               <a:rPr lang="en-US" sz="3600" dirty="0" smtClean="0"/>
-              <a:t>Why, How</a:t>
-            </a:r>
-            <a:endParaRPr lang="en-US" sz="3600" dirty="0"/>
+              <a:t>Sprint 2: Add some requirements</a:t>
+            </a:r>
+            <a:endParaRPr lang="en-US" sz="3600" dirty="0" smtClean="0"/>
           </a:p>
           <a:p>
             <a:r>
               <a:rPr lang="en-US" sz="3600" dirty="0" smtClean="0"/>
-              <a:t>Limitations of Parallel Processing</a:t>
-            </a:r>
-            <a:endParaRPr lang="en-US" sz="3600" dirty="0"/>
+              <a:t>Sprint 3: Heap on speed demands</a:t>
+            </a:r>
           </a:p>
           <a:p>
             <a:r>
               <a:rPr lang="en-US" sz="3600" dirty="0" smtClean="0"/>
-              <a:t>Distributed Parallel – The Hard Way</a:t>
-            </a:r>
-            <a:endParaRPr lang="en-US" sz="3600" dirty="0"/>
+              <a:t>Sprint 4: Add crazy  impossible</a:t>
+            </a:r>
           </a:p>
           <a:p>
             <a:r>
               <a:rPr lang="en-US" sz="3600" dirty="0" smtClean="0"/>
-              <a:t>Distributed Parallel – The Easy Way</a:t>
-            </a:r>
-          </a:p>
-          <a:p>
-            <a:r>
-              <a:rPr lang="en-US" sz="3600" dirty="0" smtClean="0"/>
-              <a:t>Demo, Code Review, Q&amp;A</a:t>
+              <a:t>Retrospective &amp; Code Review</a:t>
             </a:r>
             <a:endParaRPr lang="en-US" sz="3600" dirty="0" smtClean="0"/>
           </a:p>
@@ -6698,7 +6520,11 @@
             </a:r>
             <a:r>
               <a:rPr lang="en-US" sz="4000" dirty="0" err="1" smtClean="0"/>
-              <a:t>.TaskParallelLibrary</a:t>
+              <a:t>.DoSprint</a:t>
+            </a:r>
+            <a:r>
+              <a:rPr lang="en-US" sz="4000" dirty="0" smtClean="0"/>
+              <a:t>(1)</a:t>
             </a:r>
             <a:endParaRPr sz="4000" dirty="0"/>
           </a:p>
@@ -6717,1271 +6543,62 @@
         <p:spPr/>
         <p:txBody>
           <a:bodyPr>
-            <a:normAutofit lnSpcReduction="10000"/>
+            <a:normAutofit fontScale="92500"/>
           </a:bodyPr>
           <a:lstStyle/>
           <a:p>
             <a:r>
               <a:rPr lang="en-US" sz="3600" dirty="0" smtClean="0"/>
-              <a:t>Old School</a:t>
+              <a:t>As a boss</a:t>
+            </a:r>
+          </a:p>
+          <a:p>
+            <a:r>
+              <a:rPr lang="en-US" sz="3600" dirty="0" smtClean="0"/>
+              <a:t>I want performance data that measures</a:t>
             </a:r>
           </a:p>
           <a:p>
             <a:pPr lvl="1"/>
             <a:r>
               <a:rPr lang="en-US" sz="3400" dirty="0" smtClean="0"/>
-              <a:t>Thread</a:t>
+              <a:t>How long it takes to reach our home page</a:t>
+            </a:r>
+          </a:p>
+          <a:p>
+            <a:pPr lvl="1"/>
+            <a:r>
+              <a:rPr lang="en-US" sz="3400" dirty="0" smtClean="0"/>
+              <a:t>How long it takes to download our home page</a:t>
+            </a:r>
+          </a:p>
+          <a:p>
+            <a:r>
+              <a:rPr lang="en-US" sz="3600" dirty="0" smtClean="0"/>
+              <a:t>So that I can make some charts and graphs</a:t>
+            </a:r>
+          </a:p>
+          <a:p>
+            <a:pPr lvl="1"/>
+            <a:r>
+              <a:rPr lang="en-US" sz="3400" dirty="0" smtClean="0"/>
+              <a:t>To determine your value, and</a:t>
+            </a:r>
+          </a:p>
+          <a:p>
+            <a:pPr lvl="1"/>
+            <a:r>
+              <a:rPr lang="en-US" sz="3400" dirty="0" smtClean="0"/>
+              <a:t>To impress my boss</a:t>
             </a:r>
             <a:endParaRPr lang="en-US" sz="3400" dirty="0"/>
-          </a:p>
-          <a:p>
-            <a:pPr lvl="1"/>
-            <a:r>
-              <a:rPr lang="en-US" sz="3400" dirty="0" smtClean="0"/>
-              <a:t>ThreadPool</a:t>
-            </a:r>
-            <a:endParaRPr lang="en-US" sz="3400" dirty="0"/>
-          </a:p>
-          <a:p>
-            <a:r>
-              <a:rPr lang="en-US" sz="3600" dirty="0" smtClean="0"/>
-              <a:t>TPL Coolness</a:t>
-            </a:r>
-          </a:p>
-          <a:p>
-            <a:pPr lvl="1"/>
-            <a:r>
-              <a:rPr lang="en-US" sz="3400" dirty="0" smtClean="0"/>
-              <a:t>Task and Parallel</a:t>
-            </a:r>
-          </a:p>
-          <a:p>
-            <a:pPr lvl="1"/>
-            <a:r>
-              <a:rPr lang="en-US" sz="3400" dirty="0" smtClean="0"/>
-              <a:t>Who?</a:t>
-            </a:r>
-          </a:p>
-          <a:p>
-            <a:pPr lvl="1"/>
-            <a:r>
-              <a:rPr lang="en-US" sz="3400" dirty="0"/>
-              <a:t>Why &amp; Where</a:t>
-            </a:r>
-            <a:r>
-              <a:rPr lang="en-US" sz="3400" dirty="0" smtClean="0"/>
-              <a:t>?</a:t>
-            </a:r>
-            <a:endParaRPr lang="en-US" sz="3400" dirty="0"/>
-          </a:p>
-        </p:txBody>
-      </p:sp>
-      <p:sp>
-        <p:nvSpPr>
-          <p:cNvPr id="2" name="Rectangle 1"/>
-          <p:cNvSpPr>
-            <a:spLocks noChangeArrowheads="1"/>
-          </p:cNvSpPr>
-          <p:nvPr/>
-        </p:nvSpPr>
-        <p:spPr bwMode="auto">
-          <a:xfrm>
-            <a:off x="5943600" y="4797640"/>
-            <a:ext cx="4897495" cy="1569660"/>
-          </a:xfrm>
-          <a:prstGeom prst="rect">
-            <a:avLst/>
-          </a:prstGeom>
-          <a:solidFill>
-            <a:srgbClr val="FFFFFF"/>
-          </a:solidFill>
-          <a:ln>
-            <a:noFill/>
-          </a:ln>
-          <a:effectLst/>
-          <a:extLst>
-            <a:ext uri="{91240B29-F687-4F45-9708-019B960494DF}">
-              <a14:hiddenLine xmlns:a14="http://schemas.microsoft.com/office/drawing/2010/main" w="9525">
-                <a:solidFill>
-                  <a:schemeClr val="tx1"/>
-                </a:solidFill>
-                <a:miter lim="800000"/>
-                <a:headEnd/>
-                <a:tailEnd/>
-              </a14:hiddenLine>
-            </a:ext>
-            <a:ext uri="{AF507438-7753-43E0-B8FC-AC1667EBCBE1}">
-              <a14:hiddenEffects xmlns:a14="http://schemas.microsoft.com/office/drawing/2010/main">
-                <a:effectLst>
-                  <a:outerShdw dist="35921" dir="2700000" algn="ctr" rotWithShape="0">
-                    <a:schemeClr val="bg2"/>
-                  </a:outerShdw>
-                </a:effectLst>
-              </a14:hiddenEffects>
-            </a:ext>
-          </a:extLst>
-        </p:spPr>
-        <p:txBody>
-          <a:bodyPr vert="horz" wrap="square" lIns="91440" tIns="45720" rIns="91440" bIns="45720" numCol="1" anchor="ctr" anchorCtr="0" compatLnSpc="1">
-            <a:prstTxWarp prst="textNoShape">
-              <a:avLst/>
-            </a:prstTxWarp>
-            <a:spAutoFit/>
-          </a:bodyPr>
-          <a:lstStyle/>
-          <a:p>
-            <a:pPr marL="0" marR="0" lvl="0" indent="0" algn="l" defTabSz="914400" rtl="0" eaLnBrk="0" fontAlgn="base" latinLnBrk="0" hangingPunct="0">
-              <a:lnSpc>
-                <a:spcPct val="100000"/>
-              </a:lnSpc>
-              <a:spcBef>
-                <a:spcPct val="0"/>
-              </a:spcBef>
-              <a:spcAft>
-                <a:spcPct val="0"/>
-              </a:spcAft>
-              <a:buClrTx/>
-              <a:buSzTx/>
-              <a:buFontTx/>
-              <a:buNone/>
-              <a:tabLst/>
-            </a:pPr>
-            <a:r>
-              <a:rPr kumimoji="0" lang="en-US" sz="1600" b="0" i="0" u="none" strike="noStrike" cap="none" normalizeH="0" baseline="0" dirty="0" err="1" smtClean="0">
-                <a:ln>
-                  <a:noFill/>
-                </a:ln>
-                <a:solidFill>
-                  <a:srgbClr val="0000FF"/>
-                </a:solidFill>
-                <a:effectLst/>
-                <a:latin typeface="Consolas" panose="020B0609020204030204" pitchFamily="49" charset="0"/>
-                <a:cs typeface="Consolas" panose="020B0609020204030204" pitchFamily="49" charset="0"/>
-              </a:rPr>
-              <a:t>var</a:t>
-            </a:r>
-            <a:r>
-              <a:rPr kumimoji="0" lang="en-US" sz="1600" b="0" i="0" u="none" strike="noStrike" cap="none" normalizeH="0" baseline="0" dirty="0" smtClean="0">
-                <a:ln>
-                  <a:noFill/>
-                </a:ln>
-                <a:solidFill>
-                  <a:srgbClr val="000000"/>
-                </a:solidFill>
-                <a:effectLst/>
-                <a:latin typeface="Consolas" panose="020B0609020204030204" pitchFamily="49" charset="0"/>
-                <a:cs typeface="Consolas" panose="020B0609020204030204" pitchFamily="49" charset="0"/>
-              </a:rPr>
-              <a:t> from = 0; </a:t>
-            </a:r>
-          </a:p>
-          <a:p>
-            <a:pPr marL="0" marR="0" lvl="0" indent="0" algn="l" defTabSz="914400" rtl="0" eaLnBrk="0" fontAlgn="base" latinLnBrk="0" hangingPunct="0">
-              <a:lnSpc>
-                <a:spcPct val="100000"/>
-              </a:lnSpc>
-              <a:spcBef>
-                <a:spcPct val="0"/>
-              </a:spcBef>
-              <a:spcAft>
-                <a:spcPct val="0"/>
-              </a:spcAft>
-              <a:buClrTx/>
-              <a:buSzTx/>
-              <a:buFontTx/>
-              <a:buNone/>
-              <a:tabLst/>
-            </a:pPr>
-            <a:r>
-              <a:rPr kumimoji="0" lang="en-US" sz="1600" b="0" i="0" u="none" strike="noStrike" cap="none" normalizeH="0" baseline="0" dirty="0" err="1" smtClean="0">
-                <a:ln>
-                  <a:noFill/>
-                </a:ln>
-                <a:solidFill>
-                  <a:srgbClr val="0000FF"/>
-                </a:solidFill>
-                <a:effectLst/>
-                <a:latin typeface="Consolas" panose="020B0609020204030204" pitchFamily="49" charset="0"/>
-                <a:cs typeface="Consolas" panose="020B0609020204030204" pitchFamily="49" charset="0"/>
-              </a:rPr>
-              <a:t>var</a:t>
-            </a:r>
-            <a:r>
-              <a:rPr kumimoji="0" lang="en-US" sz="1600" b="0" i="0" u="none" strike="noStrike" cap="none" normalizeH="0" baseline="0" dirty="0" smtClean="0">
-                <a:ln>
-                  <a:noFill/>
-                </a:ln>
-                <a:solidFill>
-                  <a:srgbClr val="000000"/>
-                </a:solidFill>
-                <a:effectLst/>
-                <a:latin typeface="Consolas" panose="020B0609020204030204" pitchFamily="49" charset="0"/>
-                <a:cs typeface="Consolas" panose="020B0609020204030204" pitchFamily="49" charset="0"/>
-              </a:rPr>
-              <a:t> to = 500; </a:t>
-            </a:r>
-          </a:p>
-          <a:p>
-            <a:pPr marL="0" marR="0" lvl="0" indent="0" algn="l" defTabSz="914400" rtl="0" eaLnBrk="0" fontAlgn="base" latinLnBrk="0" hangingPunct="0">
-              <a:lnSpc>
-                <a:spcPct val="100000"/>
-              </a:lnSpc>
-              <a:spcBef>
-                <a:spcPct val="0"/>
-              </a:spcBef>
-              <a:spcAft>
-                <a:spcPct val="0"/>
-              </a:spcAft>
-              <a:buClrTx/>
-              <a:buSzTx/>
-              <a:buFontTx/>
-              <a:buNone/>
-              <a:tabLst/>
-            </a:pPr>
-            <a:r>
-              <a:rPr kumimoji="0" lang="en-US" sz="1600" b="0" i="0" u="none" strike="noStrike" cap="none" normalizeH="0" baseline="0" dirty="0" err="1" smtClean="0">
-                <a:ln>
-                  <a:noFill/>
-                </a:ln>
-                <a:solidFill>
-                  <a:srgbClr val="2B91AF"/>
-                </a:solidFill>
-                <a:effectLst/>
-                <a:latin typeface="Consolas" panose="020B0609020204030204" pitchFamily="49" charset="0"/>
-                <a:cs typeface="Consolas" panose="020B0609020204030204" pitchFamily="49" charset="0"/>
-              </a:rPr>
-              <a:t>Parallel</a:t>
-            </a:r>
-            <a:r>
-              <a:rPr kumimoji="0" lang="en-US" sz="1600" b="0" i="0" u="none" strike="noStrike" cap="none" normalizeH="0" baseline="0" dirty="0" err="1" smtClean="0">
-                <a:ln>
-                  <a:noFill/>
-                </a:ln>
-                <a:solidFill>
-                  <a:srgbClr val="000000"/>
-                </a:solidFill>
-                <a:effectLst/>
-                <a:latin typeface="Consolas" panose="020B0609020204030204" pitchFamily="49" charset="0"/>
-                <a:cs typeface="Consolas" panose="020B0609020204030204" pitchFamily="49" charset="0"/>
-              </a:rPr>
-              <a:t>.For</a:t>
-            </a:r>
-            <a:r>
-              <a:rPr kumimoji="0" lang="en-US" sz="1600" b="0" i="0" u="none" strike="noStrike" cap="none" normalizeH="0" baseline="0" dirty="0" smtClean="0">
-                <a:ln>
-                  <a:noFill/>
-                </a:ln>
-                <a:solidFill>
-                  <a:srgbClr val="000000"/>
-                </a:solidFill>
-                <a:effectLst/>
-                <a:latin typeface="Consolas" panose="020B0609020204030204" pitchFamily="49" charset="0"/>
-                <a:cs typeface="Consolas" panose="020B0609020204030204" pitchFamily="49" charset="0"/>
-              </a:rPr>
-              <a:t>(from, to, index =&gt;</a:t>
-            </a:r>
-          </a:p>
-          <a:p>
-            <a:pPr marL="0" marR="0" lvl="0" indent="0" algn="l" defTabSz="914400" rtl="0" eaLnBrk="0" fontAlgn="base" latinLnBrk="0" hangingPunct="0">
-              <a:lnSpc>
-                <a:spcPct val="100000"/>
-              </a:lnSpc>
-              <a:spcBef>
-                <a:spcPct val="0"/>
-              </a:spcBef>
-              <a:spcAft>
-                <a:spcPct val="0"/>
-              </a:spcAft>
-              <a:buClrTx/>
-              <a:buSzTx/>
-              <a:buFontTx/>
-              <a:buNone/>
-              <a:tabLst/>
-            </a:pPr>
-            <a:r>
-              <a:rPr kumimoji="0" lang="en-US" sz="1600" b="0" i="0" u="none" strike="noStrike" cap="none" normalizeH="0" baseline="0" dirty="0" smtClean="0">
-                <a:ln>
-                  <a:noFill/>
-                </a:ln>
-                <a:solidFill>
-                  <a:srgbClr val="000000"/>
-                </a:solidFill>
-                <a:effectLst/>
-                <a:latin typeface="Consolas" panose="020B0609020204030204" pitchFamily="49" charset="0"/>
-                <a:cs typeface="Consolas" panose="020B0609020204030204" pitchFamily="49" charset="0"/>
-              </a:rPr>
-              <a:t>{</a:t>
-            </a:r>
-          </a:p>
-          <a:p>
-            <a:pPr marL="0" marR="0" lvl="0" indent="0" algn="l" defTabSz="914400" rtl="0" eaLnBrk="0" fontAlgn="base" latinLnBrk="0" hangingPunct="0">
-              <a:lnSpc>
-                <a:spcPct val="100000"/>
-              </a:lnSpc>
-              <a:spcBef>
-                <a:spcPct val="0"/>
-              </a:spcBef>
-              <a:spcAft>
-                <a:spcPct val="0"/>
-              </a:spcAft>
-              <a:buClrTx/>
-              <a:buSzTx/>
-              <a:buFontTx/>
-              <a:buNone/>
-              <a:tabLst/>
-            </a:pPr>
-            <a:r>
-              <a:rPr kumimoji="0" lang="en-US" sz="1600" b="0" i="0" u="none" strike="noStrike" cap="none" normalizeH="0" baseline="0" dirty="0" smtClean="0">
-                <a:ln>
-                  <a:noFill/>
-                </a:ln>
-                <a:solidFill>
-                  <a:srgbClr val="000000"/>
-                </a:solidFill>
-                <a:effectLst/>
-                <a:latin typeface="Consolas" panose="020B0609020204030204" pitchFamily="49" charset="0"/>
-                <a:cs typeface="Consolas" panose="020B0609020204030204" pitchFamily="49" charset="0"/>
-              </a:rPr>
-              <a:t>    </a:t>
-            </a:r>
-            <a:r>
-              <a:rPr kumimoji="0" lang="en-US" sz="1600" b="0" i="0" u="none" strike="noStrike" cap="none" normalizeH="0" baseline="0" dirty="0" smtClean="0">
-                <a:ln>
-                  <a:noFill/>
-                </a:ln>
-                <a:solidFill>
-                  <a:srgbClr val="008000"/>
-                </a:solidFill>
-                <a:effectLst/>
-                <a:latin typeface="Consolas" panose="020B0609020204030204" pitchFamily="49" charset="0"/>
-                <a:cs typeface="Consolas" panose="020B0609020204030204" pitchFamily="49" charset="0"/>
-              </a:rPr>
-              <a:t>//do something with index in parallel</a:t>
-            </a:r>
-          </a:p>
-          <a:p>
-            <a:pPr marL="0" marR="0" lvl="0" indent="0" algn="l" defTabSz="914400" rtl="0" eaLnBrk="0" fontAlgn="base" latinLnBrk="0" hangingPunct="0">
-              <a:lnSpc>
-                <a:spcPct val="100000"/>
-              </a:lnSpc>
-              <a:spcBef>
-                <a:spcPct val="0"/>
-              </a:spcBef>
-              <a:spcAft>
-                <a:spcPct val="0"/>
-              </a:spcAft>
-              <a:buClrTx/>
-              <a:buSzTx/>
-              <a:buFontTx/>
-              <a:buNone/>
-              <a:tabLst/>
-            </a:pPr>
-            <a:r>
-              <a:rPr kumimoji="0" lang="en-US" sz="1600" b="0" i="0" u="none" strike="noStrike" cap="none" normalizeH="0" baseline="0" dirty="0" smtClean="0">
-                <a:ln>
-                  <a:noFill/>
-                </a:ln>
-                <a:solidFill>
-                  <a:srgbClr val="000000"/>
-                </a:solidFill>
-                <a:effectLst/>
-                <a:latin typeface="Consolas" panose="020B0609020204030204" pitchFamily="49" charset="0"/>
-                <a:cs typeface="Consolas" panose="020B0609020204030204" pitchFamily="49" charset="0"/>
-              </a:rPr>
-              <a:t>}); </a:t>
-            </a:r>
-            <a:endParaRPr kumimoji="0" lang="en-US" sz="3600" b="0" i="0" u="none" strike="noStrike" cap="none" normalizeH="0" baseline="0" dirty="0" smtClean="0">
-              <a:ln>
-                <a:noFill/>
-              </a:ln>
-              <a:solidFill>
-                <a:schemeClr val="tx1"/>
-              </a:solidFill>
-              <a:effectLst/>
-              <a:latin typeface="Arial" panose="020B0604020202020204" pitchFamily="34" charset="0"/>
-            </a:endParaRPr>
-          </a:p>
-        </p:txBody>
-      </p:sp>
-      <p:sp>
-        <p:nvSpPr>
-          <p:cNvPr id="3" name="Rectangle 2"/>
-          <p:cNvSpPr>
-            <a:spLocks noChangeArrowheads="1"/>
-          </p:cNvSpPr>
-          <p:nvPr/>
-        </p:nvSpPr>
-        <p:spPr bwMode="auto">
-          <a:xfrm>
-            <a:off x="5943600" y="1810167"/>
-            <a:ext cx="4897495" cy="2800767"/>
-          </a:xfrm>
-          <a:prstGeom prst="rect">
-            <a:avLst/>
-          </a:prstGeom>
-          <a:solidFill>
-            <a:srgbClr val="FFFFFF"/>
-          </a:solidFill>
-          <a:ln>
-            <a:noFill/>
-          </a:ln>
-          <a:effectLst/>
-          <a:extLst>
-            <a:ext uri="{91240B29-F687-4F45-9708-019B960494DF}">
-              <a14:hiddenLine xmlns:a14="http://schemas.microsoft.com/office/drawing/2010/main" w="9525">
-                <a:solidFill>
-                  <a:schemeClr val="tx1"/>
-                </a:solidFill>
-                <a:miter lim="800000"/>
-                <a:headEnd/>
-                <a:tailEnd/>
-              </a14:hiddenLine>
-            </a:ext>
-            <a:ext uri="{AF507438-7753-43E0-B8FC-AC1667EBCBE1}">
-              <a14:hiddenEffects xmlns:a14="http://schemas.microsoft.com/office/drawing/2010/main">
-                <a:effectLst>
-                  <a:outerShdw dist="35921" dir="2700000" algn="ctr" rotWithShape="0">
-                    <a:schemeClr val="bg2"/>
-                  </a:outerShdw>
-                </a:effectLst>
-              </a14:hiddenEffects>
-            </a:ext>
-          </a:extLst>
-        </p:spPr>
-        <p:txBody>
-          <a:bodyPr vert="horz" wrap="none" lIns="91440" tIns="45720" rIns="91440" bIns="45720" numCol="1" anchor="ctr" anchorCtr="0" compatLnSpc="1">
-            <a:prstTxWarp prst="textNoShape">
-              <a:avLst/>
-            </a:prstTxWarp>
-            <a:spAutoFit/>
-          </a:bodyPr>
-          <a:lstStyle/>
-          <a:p>
-            <a:pPr marL="0" marR="0" lvl="0" indent="0" algn="l" defTabSz="914400" rtl="0" eaLnBrk="0" fontAlgn="base" latinLnBrk="0" hangingPunct="0">
-              <a:lnSpc>
-                <a:spcPct val="100000"/>
-              </a:lnSpc>
-              <a:spcBef>
-                <a:spcPct val="0"/>
-              </a:spcBef>
-              <a:spcAft>
-                <a:spcPct val="0"/>
-              </a:spcAft>
-              <a:buClrTx/>
-              <a:buSzTx/>
-              <a:buFontTx/>
-              <a:buNone/>
-              <a:tabLst/>
-            </a:pPr>
-            <a:r>
-              <a:rPr kumimoji="0" lang="en-US" sz="1600" b="0" i="0" u="none" strike="noStrike" cap="none" normalizeH="0" baseline="0" dirty="0" err="1" smtClean="0">
-                <a:ln>
-                  <a:noFill/>
-                </a:ln>
-                <a:solidFill>
-                  <a:srgbClr val="0000FF"/>
-                </a:solidFill>
-                <a:effectLst/>
-                <a:latin typeface="Consolas" panose="020B0609020204030204" pitchFamily="49" charset="0"/>
-                <a:cs typeface="Consolas" panose="020B0609020204030204" pitchFamily="49" charset="0"/>
-              </a:rPr>
-              <a:t>var</a:t>
-            </a:r>
-            <a:r>
-              <a:rPr kumimoji="0" lang="en-US" sz="1600" b="0" i="0" u="none" strike="noStrike" cap="none" normalizeH="0" baseline="0" dirty="0" smtClean="0">
-                <a:ln>
-                  <a:noFill/>
-                </a:ln>
-                <a:solidFill>
-                  <a:srgbClr val="000000"/>
-                </a:solidFill>
-                <a:effectLst/>
-                <a:latin typeface="Consolas" panose="020B0609020204030204" pitchFamily="49" charset="0"/>
-                <a:cs typeface="Consolas" panose="020B0609020204030204" pitchFamily="49" charset="0"/>
-              </a:rPr>
-              <a:t> tasks = </a:t>
-            </a:r>
-            <a:r>
-              <a:rPr kumimoji="0" lang="en-US" sz="1600" b="0" i="0" u="none" strike="noStrike" cap="none" normalizeH="0" baseline="0" dirty="0" smtClean="0">
-                <a:ln>
-                  <a:noFill/>
-                </a:ln>
-                <a:solidFill>
-                  <a:srgbClr val="0000FF"/>
-                </a:solidFill>
-                <a:effectLst/>
-                <a:latin typeface="Consolas" panose="020B0609020204030204" pitchFamily="49" charset="0"/>
-                <a:cs typeface="Consolas" panose="020B0609020204030204" pitchFamily="49" charset="0"/>
-              </a:rPr>
-              <a:t>new</a:t>
-            </a:r>
-            <a:r>
-              <a:rPr kumimoji="0" lang="en-US" sz="1600" b="0" i="0" u="none" strike="noStrike" cap="none" normalizeH="0" baseline="0" dirty="0" smtClean="0">
-                <a:ln>
-                  <a:noFill/>
-                </a:ln>
-                <a:solidFill>
-                  <a:srgbClr val="000000"/>
-                </a:solidFill>
-                <a:effectLst/>
-                <a:latin typeface="Consolas" panose="020B0609020204030204" pitchFamily="49" charset="0"/>
-                <a:cs typeface="Consolas" panose="020B0609020204030204" pitchFamily="49" charset="0"/>
-              </a:rPr>
-              <a:t> </a:t>
-            </a:r>
-            <a:r>
-              <a:rPr kumimoji="0" lang="en-US" sz="1600" b="0" i="0" u="none" strike="noStrike" cap="none" normalizeH="0" baseline="0" dirty="0" smtClean="0">
-                <a:ln>
-                  <a:noFill/>
-                </a:ln>
-                <a:solidFill>
-                  <a:srgbClr val="2B91AF"/>
-                </a:solidFill>
-                <a:effectLst/>
-                <a:latin typeface="Consolas" panose="020B0609020204030204" pitchFamily="49" charset="0"/>
-                <a:cs typeface="Consolas" panose="020B0609020204030204" pitchFamily="49" charset="0"/>
-              </a:rPr>
-              <a:t>List</a:t>
-            </a:r>
-            <a:r>
-              <a:rPr kumimoji="0" lang="en-US" sz="1600" b="0" i="0" u="none" strike="noStrike" cap="none" normalizeH="0" baseline="0" dirty="0" smtClean="0">
-                <a:ln>
-                  <a:noFill/>
-                </a:ln>
-                <a:solidFill>
-                  <a:srgbClr val="000000"/>
-                </a:solidFill>
-                <a:effectLst/>
-                <a:latin typeface="Consolas" panose="020B0609020204030204" pitchFamily="49" charset="0"/>
-                <a:cs typeface="Consolas" panose="020B0609020204030204" pitchFamily="49" charset="0"/>
-              </a:rPr>
-              <a:t>&lt;</a:t>
-            </a:r>
-            <a:r>
-              <a:rPr kumimoji="0" lang="en-US" sz="1600" b="0" i="0" u="none" strike="noStrike" cap="none" normalizeH="0" baseline="0" dirty="0" smtClean="0">
-                <a:ln>
-                  <a:noFill/>
-                </a:ln>
-                <a:solidFill>
-                  <a:srgbClr val="2B91AF"/>
-                </a:solidFill>
-                <a:effectLst/>
-                <a:latin typeface="Consolas" panose="020B0609020204030204" pitchFamily="49" charset="0"/>
-                <a:cs typeface="Consolas" panose="020B0609020204030204" pitchFamily="49" charset="0"/>
-              </a:rPr>
-              <a:t>Task</a:t>
-            </a:r>
-            <a:r>
-              <a:rPr kumimoji="0" lang="en-US" sz="1600" b="0" i="0" u="none" strike="noStrike" cap="none" normalizeH="0" baseline="0" dirty="0" smtClean="0">
-                <a:ln>
-                  <a:noFill/>
-                </a:ln>
-                <a:solidFill>
-                  <a:srgbClr val="000000"/>
-                </a:solidFill>
-                <a:effectLst/>
-                <a:latin typeface="Consolas" panose="020B0609020204030204" pitchFamily="49" charset="0"/>
-                <a:cs typeface="Consolas" panose="020B0609020204030204" pitchFamily="49" charset="0"/>
-              </a:rPr>
-              <a:t>&gt;(); </a:t>
-            </a:r>
-          </a:p>
-          <a:p>
-            <a:pPr marL="0" marR="0" lvl="0" indent="0" algn="l" defTabSz="914400" rtl="0" eaLnBrk="0" fontAlgn="base" latinLnBrk="0" hangingPunct="0">
-              <a:lnSpc>
-                <a:spcPct val="100000"/>
-              </a:lnSpc>
-              <a:spcBef>
-                <a:spcPct val="0"/>
-              </a:spcBef>
-              <a:spcAft>
-                <a:spcPct val="0"/>
-              </a:spcAft>
-              <a:buClrTx/>
-              <a:buSzTx/>
-              <a:buFontTx/>
-              <a:buNone/>
-              <a:tabLst/>
-            </a:pPr>
-            <a:r>
-              <a:rPr kumimoji="0" lang="en-US" sz="1600" b="0" i="0" u="none" strike="noStrike" cap="none" normalizeH="0" baseline="0" dirty="0" smtClean="0">
-                <a:ln>
-                  <a:noFill/>
-                </a:ln>
-                <a:solidFill>
-                  <a:srgbClr val="0000FF"/>
-                </a:solidFill>
-                <a:effectLst/>
-                <a:latin typeface="Consolas" panose="020B0609020204030204" pitchFamily="49" charset="0"/>
-                <a:cs typeface="Consolas" panose="020B0609020204030204" pitchFamily="49" charset="0"/>
-              </a:rPr>
-              <a:t>for</a:t>
-            </a:r>
-            <a:r>
-              <a:rPr kumimoji="0" lang="en-US" sz="1600" b="0" i="0" u="none" strike="noStrike" cap="none" normalizeH="0" baseline="0" dirty="0" smtClean="0">
-                <a:ln>
-                  <a:noFill/>
-                </a:ln>
-                <a:solidFill>
-                  <a:srgbClr val="000000"/>
-                </a:solidFill>
-                <a:effectLst/>
-                <a:latin typeface="Consolas" panose="020B0609020204030204" pitchFamily="49" charset="0"/>
-                <a:cs typeface="Consolas" panose="020B0609020204030204" pitchFamily="49" charset="0"/>
-              </a:rPr>
-              <a:t> (</a:t>
-            </a:r>
-            <a:r>
-              <a:rPr kumimoji="0" lang="en-US" sz="1600" b="0" i="0" u="none" strike="noStrike" cap="none" normalizeH="0" baseline="0" dirty="0" err="1" smtClean="0">
-                <a:ln>
-                  <a:noFill/>
-                </a:ln>
-                <a:solidFill>
-                  <a:srgbClr val="0000FF"/>
-                </a:solidFill>
-                <a:effectLst/>
-                <a:latin typeface="Consolas" panose="020B0609020204030204" pitchFamily="49" charset="0"/>
-                <a:cs typeface="Consolas" panose="020B0609020204030204" pitchFamily="49" charset="0"/>
-              </a:rPr>
-              <a:t>int</a:t>
-            </a:r>
-            <a:r>
-              <a:rPr kumimoji="0" lang="en-US" sz="1600" b="0" i="0" u="none" strike="noStrike" cap="none" normalizeH="0" baseline="0" dirty="0" smtClean="0">
-                <a:ln>
-                  <a:noFill/>
-                </a:ln>
-                <a:solidFill>
-                  <a:srgbClr val="000000"/>
-                </a:solidFill>
-                <a:effectLst/>
-                <a:latin typeface="Consolas" panose="020B0609020204030204" pitchFamily="49" charset="0"/>
-                <a:cs typeface="Consolas" panose="020B0609020204030204" pitchFamily="49" charset="0"/>
-              </a:rPr>
-              <a:t> </a:t>
-            </a:r>
-            <a:r>
-              <a:rPr kumimoji="0" lang="en-US" sz="1600" b="0" i="0" u="none" strike="noStrike" cap="none" normalizeH="0" baseline="0" dirty="0" err="1" smtClean="0">
-                <a:ln>
-                  <a:noFill/>
-                </a:ln>
-                <a:solidFill>
-                  <a:srgbClr val="000000"/>
-                </a:solidFill>
-                <a:effectLst/>
-                <a:latin typeface="Consolas" panose="020B0609020204030204" pitchFamily="49" charset="0"/>
-                <a:cs typeface="Consolas" panose="020B0609020204030204" pitchFamily="49" charset="0"/>
-              </a:rPr>
-              <a:t>i</a:t>
-            </a:r>
-            <a:r>
-              <a:rPr kumimoji="0" lang="en-US" sz="1600" b="0" i="0" u="none" strike="noStrike" cap="none" normalizeH="0" baseline="0" dirty="0" smtClean="0">
-                <a:ln>
-                  <a:noFill/>
-                </a:ln>
-                <a:solidFill>
-                  <a:srgbClr val="000000"/>
-                </a:solidFill>
-                <a:effectLst/>
-                <a:latin typeface="Consolas" panose="020B0609020204030204" pitchFamily="49" charset="0"/>
-                <a:cs typeface="Consolas" panose="020B0609020204030204" pitchFamily="49" charset="0"/>
-              </a:rPr>
-              <a:t> = 0; </a:t>
-            </a:r>
-            <a:r>
-              <a:rPr kumimoji="0" lang="en-US" sz="1600" b="0" i="0" u="none" strike="noStrike" cap="none" normalizeH="0" baseline="0" dirty="0" err="1" smtClean="0">
-                <a:ln>
-                  <a:noFill/>
-                </a:ln>
-                <a:solidFill>
-                  <a:srgbClr val="000000"/>
-                </a:solidFill>
-                <a:effectLst/>
-                <a:latin typeface="Consolas" panose="020B0609020204030204" pitchFamily="49" charset="0"/>
-                <a:cs typeface="Consolas" panose="020B0609020204030204" pitchFamily="49" charset="0"/>
-              </a:rPr>
-              <a:t>i</a:t>
-            </a:r>
-            <a:r>
-              <a:rPr kumimoji="0" lang="en-US" sz="1600" b="0" i="0" u="none" strike="noStrike" cap="none" normalizeH="0" baseline="0" dirty="0" smtClean="0">
-                <a:ln>
-                  <a:noFill/>
-                </a:ln>
-                <a:solidFill>
-                  <a:srgbClr val="000000"/>
-                </a:solidFill>
-                <a:effectLst/>
-                <a:latin typeface="Consolas" panose="020B0609020204030204" pitchFamily="49" charset="0"/>
-                <a:cs typeface="Consolas" panose="020B0609020204030204" pitchFamily="49" charset="0"/>
-              </a:rPr>
-              <a:t> &lt; 10; </a:t>
-            </a:r>
-            <a:r>
-              <a:rPr kumimoji="0" lang="en-US" sz="1600" b="0" i="0" u="none" strike="noStrike" cap="none" normalizeH="0" baseline="0" dirty="0" err="1" smtClean="0">
-                <a:ln>
-                  <a:noFill/>
-                </a:ln>
-                <a:solidFill>
-                  <a:srgbClr val="000000"/>
-                </a:solidFill>
-                <a:effectLst/>
-                <a:latin typeface="Consolas" panose="020B0609020204030204" pitchFamily="49" charset="0"/>
-                <a:cs typeface="Consolas" panose="020B0609020204030204" pitchFamily="49" charset="0"/>
-              </a:rPr>
-              <a:t>i</a:t>
-            </a:r>
-            <a:r>
-              <a:rPr kumimoji="0" lang="en-US" sz="1600" b="0" i="0" u="none" strike="noStrike" cap="none" normalizeH="0" baseline="0" dirty="0" smtClean="0">
-                <a:ln>
-                  <a:noFill/>
-                </a:ln>
-                <a:solidFill>
-                  <a:srgbClr val="000000"/>
-                </a:solidFill>
-                <a:effectLst/>
-                <a:latin typeface="Consolas" panose="020B0609020204030204" pitchFamily="49" charset="0"/>
-                <a:cs typeface="Consolas" panose="020B0609020204030204" pitchFamily="49" charset="0"/>
-              </a:rPr>
-              <a:t>++) </a:t>
-            </a:r>
-          </a:p>
-          <a:p>
-            <a:pPr marL="0" marR="0" lvl="0" indent="0" algn="l" defTabSz="914400" rtl="0" eaLnBrk="0" fontAlgn="base" latinLnBrk="0" hangingPunct="0">
-              <a:lnSpc>
-                <a:spcPct val="100000"/>
-              </a:lnSpc>
-              <a:spcBef>
-                <a:spcPct val="0"/>
-              </a:spcBef>
-              <a:spcAft>
-                <a:spcPct val="0"/>
-              </a:spcAft>
-              <a:buClrTx/>
-              <a:buSzTx/>
-              <a:buFontTx/>
-              <a:buNone/>
-              <a:tabLst/>
-            </a:pPr>
-            <a:r>
-              <a:rPr kumimoji="0" lang="en-US" sz="1600" b="0" i="0" u="none" strike="noStrike" cap="none" normalizeH="0" baseline="0" dirty="0" smtClean="0">
-                <a:ln>
-                  <a:noFill/>
-                </a:ln>
-                <a:solidFill>
-                  <a:srgbClr val="000000"/>
-                </a:solidFill>
-                <a:effectLst/>
-                <a:latin typeface="Consolas" panose="020B0609020204030204" pitchFamily="49" charset="0"/>
-                <a:cs typeface="Consolas" panose="020B0609020204030204" pitchFamily="49" charset="0"/>
-              </a:rPr>
-              <a:t>{</a:t>
-            </a:r>
-          </a:p>
-          <a:p>
-            <a:pPr lvl="0" eaLnBrk="0" fontAlgn="base" hangingPunct="0">
-              <a:spcBef>
-                <a:spcPct val="0"/>
-              </a:spcBef>
-              <a:spcAft>
-                <a:spcPct val="0"/>
-              </a:spcAft>
-            </a:pPr>
-            <a:r>
-              <a:rPr lang="en-US" sz="1600" dirty="0" smtClean="0">
-                <a:solidFill>
-                  <a:srgbClr val="0000FF"/>
-                </a:solidFill>
-                <a:latin typeface="Consolas" panose="020B0609020204030204" pitchFamily="49" charset="0"/>
-                <a:cs typeface="Consolas" panose="020B0609020204030204" pitchFamily="49" charset="0"/>
-              </a:rPr>
-              <a:t>    </a:t>
-            </a:r>
-            <a:r>
-              <a:rPr lang="en-US" sz="1600" dirty="0" err="1" smtClean="0">
-                <a:solidFill>
-                  <a:srgbClr val="0000FF"/>
-                </a:solidFill>
-                <a:latin typeface="Consolas" panose="020B0609020204030204" pitchFamily="49" charset="0"/>
-                <a:cs typeface="Consolas" panose="020B0609020204030204" pitchFamily="49" charset="0"/>
-              </a:rPr>
-              <a:t>var</a:t>
-            </a:r>
-            <a:r>
-              <a:rPr lang="en-US" sz="1600" dirty="0">
-                <a:solidFill>
-                  <a:srgbClr val="000000"/>
-                </a:solidFill>
-                <a:latin typeface="Consolas" panose="020B0609020204030204" pitchFamily="49" charset="0"/>
-                <a:cs typeface="Consolas" panose="020B0609020204030204" pitchFamily="49" charset="0"/>
-              </a:rPr>
-              <a:t> </a:t>
-            </a:r>
-            <a:r>
-              <a:rPr lang="en-US" sz="1600" dirty="0" err="1" smtClean="0">
-                <a:solidFill>
-                  <a:srgbClr val="000000"/>
-                </a:solidFill>
-                <a:latin typeface="Consolas" panose="020B0609020204030204" pitchFamily="49" charset="0"/>
-                <a:cs typeface="Consolas" panose="020B0609020204030204" pitchFamily="49" charset="0"/>
-              </a:rPr>
-              <a:t>iLoc</a:t>
-            </a:r>
-            <a:r>
-              <a:rPr lang="en-US" sz="1600" dirty="0">
-                <a:solidFill>
-                  <a:srgbClr val="000000"/>
-                </a:solidFill>
-                <a:latin typeface="Consolas" panose="020B0609020204030204" pitchFamily="49" charset="0"/>
-                <a:cs typeface="Consolas" panose="020B0609020204030204" pitchFamily="49" charset="0"/>
-              </a:rPr>
-              <a:t> = </a:t>
-            </a:r>
-            <a:r>
-              <a:rPr lang="en-US" sz="1600" dirty="0" err="1" smtClean="0">
-                <a:solidFill>
-                  <a:srgbClr val="000000"/>
-                </a:solidFill>
-                <a:latin typeface="Consolas" panose="020B0609020204030204" pitchFamily="49" charset="0"/>
-                <a:cs typeface="Consolas" panose="020B0609020204030204" pitchFamily="49" charset="0"/>
-              </a:rPr>
-              <a:t>i</a:t>
-            </a:r>
-            <a:r>
-              <a:rPr lang="en-US" sz="1600" dirty="0" smtClean="0">
-                <a:solidFill>
-                  <a:srgbClr val="000000"/>
-                </a:solidFill>
-                <a:latin typeface="Consolas" panose="020B0609020204030204" pitchFamily="49" charset="0"/>
-                <a:cs typeface="Consolas" panose="020B0609020204030204" pitchFamily="49" charset="0"/>
-              </a:rPr>
-              <a:t>;</a:t>
-            </a:r>
-            <a:endParaRPr kumimoji="0" lang="en-US" sz="1600" b="0" i="0" u="none" strike="noStrike" cap="none" normalizeH="0" baseline="0" dirty="0" smtClean="0">
-              <a:ln>
-                <a:noFill/>
-              </a:ln>
-              <a:solidFill>
-                <a:srgbClr val="000000"/>
-              </a:solidFill>
-              <a:effectLst/>
-              <a:latin typeface="Consolas" panose="020B0609020204030204" pitchFamily="49" charset="0"/>
-              <a:cs typeface="Consolas" panose="020B0609020204030204" pitchFamily="49" charset="0"/>
-            </a:endParaRPr>
-          </a:p>
-          <a:p>
-            <a:pPr marL="0" marR="0" lvl="0" indent="0" algn="l" defTabSz="914400" rtl="0" eaLnBrk="0" fontAlgn="base" latinLnBrk="0" hangingPunct="0">
-              <a:lnSpc>
-                <a:spcPct val="100000"/>
-              </a:lnSpc>
-              <a:spcBef>
-                <a:spcPct val="0"/>
-              </a:spcBef>
-              <a:spcAft>
-                <a:spcPct val="0"/>
-              </a:spcAft>
-              <a:buClrTx/>
-              <a:buSzTx/>
-              <a:buFontTx/>
-              <a:buNone/>
-              <a:tabLst/>
-            </a:pPr>
-            <a:r>
-              <a:rPr kumimoji="0" lang="en-US" sz="1600" b="0" i="0" u="none" strike="noStrike" cap="none" normalizeH="0" baseline="0" dirty="0" smtClean="0">
-                <a:ln>
-                  <a:noFill/>
-                </a:ln>
-                <a:solidFill>
-                  <a:srgbClr val="000000"/>
-                </a:solidFill>
-                <a:effectLst/>
-                <a:latin typeface="Consolas" panose="020B0609020204030204" pitchFamily="49" charset="0"/>
-                <a:cs typeface="Consolas" panose="020B0609020204030204" pitchFamily="49" charset="0"/>
-              </a:rPr>
-              <a:t>    </a:t>
-            </a:r>
-            <a:r>
-              <a:rPr kumimoji="0" lang="en-US" sz="1600" b="0" i="0" u="none" strike="noStrike" cap="none" normalizeH="0" baseline="0" dirty="0" err="1" smtClean="0">
-                <a:ln>
-                  <a:noFill/>
-                </a:ln>
-                <a:solidFill>
-                  <a:srgbClr val="000000"/>
-                </a:solidFill>
-                <a:effectLst/>
-                <a:latin typeface="Consolas" panose="020B0609020204030204" pitchFamily="49" charset="0"/>
-                <a:cs typeface="Consolas" panose="020B0609020204030204" pitchFamily="49" charset="0"/>
-              </a:rPr>
-              <a:t>tasks.Add</a:t>
-            </a:r>
-            <a:r>
-              <a:rPr kumimoji="0" lang="en-US" sz="1600" b="0" i="0" u="none" strike="noStrike" cap="none" normalizeH="0" baseline="0" dirty="0" smtClean="0">
-                <a:ln>
-                  <a:noFill/>
-                </a:ln>
-                <a:solidFill>
-                  <a:srgbClr val="000000"/>
-                </a:solidFill>
-                <a:effectLst/>
-                <a:latin typeface="Consolas" panose="020B0609020204030204" pitchFamily="49" charset="0"/>
-                <a:cs typeface="Consolas" panose="020B0609020204030204" pitchFamily="49" charset="0"/>
-              </a:rPr>
-              <a:t>(</a:t>
-            </a:r>
-            <a:r>
-              <a:rPr kumimoji="0" lang="en-US" sz="1600" b="0" i="0" u="none" strike="noStrike" cap="none" normalizeH="0" baseline="0" dirty="0" err="1" smtClean="0">
-                <a:ln>
-                  <a:noFill/>
-                </a:ln>
-                <a:solidFill>
-                  <a:srgbClr val="2B91AF"/>
-                </a:solidFill>
-                <a:effectLst/>
-                <a:latin typeface="Consolas" panose="020B0609020204030204" pitchFamily="49" charset="0"/>
-                <a:cs typeface="Consolas" panose="020B0609020204030204" pitchFamily="49" charset="0"/>
-              </a:rPr>
-              <a:t>Task</a:t>
-            </a:r>
-            <a:r>
-              <a:rPr kumimoji="0" lang="en-US" sz="1600" b="0" i="0" u="none" strike="noStrike" cap="none" normalizeH="0" baseline="0" dirty="0" err="1" smtClean="0">
-                <a:ln>
-                  <a:noFill/>
-                </a:ln>
-                <a:solidFill>
-                  <a:srgbClr val="000000"/>
-                </a:solidFill>
-                <a:effectLst/>
-                <a:latin typeface="Consolas" panose="020B0609020204030204" pitchFamily="49" charset="0"/>
-                <a:cs typeface="Consolas" panose="020B0609020204030204" pitchFamily="49" charset="0"/>
-              </a:rPr>
-              <a:t>.Factory.StartNew</a:t>
-            </a:r>
-            <a:r>
-              <a:rPr kumimoji="0" lang="en-US" sz="1600" b="0" i="0" u="none" strike="noStrike" cap="none" normalizeH="0" baseline="0" dirty="0" smtClean="0">
-                <a:ln>
-                  <a:noFill/>
-                </a:ln>
-                <a:solidFill>
-                  <a:srgbClr val="000000"/>
-                </a:solidFill>
-                <a:effectLst/>
-                <a:latin typeface="Consolas" panose="020B0609020204030204" pitchFamily="49" charset="0"/>
-                <a:cs typeface="Consolas" panose="020B0609020204030204" pitchFamily="49" charset="0"/>
-              </a:rPr>
-              <a:t>(() =&gt;</a:t>
-            </a:r>
-          </a:p>
-          <a:p>
-            <a:pPr marL="0" marR="0" lvl="0" indent="0" algn="l" defTabSz="914400" rtl="0" eaLnBrk="0" fontAlgn="base" latinLnBrk="0" hangingPunct="0">
-              <a:lnSpc>
-                <a:spcPct val="100000"/>
-              </a:lnSpc>
-              <a:spcBef>
-                <a:spcPct val="0"/>
-              </a:spcBef>
-              <a:spcAft>
-                <a:spcPct val="0"/>
-              </a:spcAft>
-              <a:buClrTx/>
-              <a:buSzTx/>
-              <a:buFontTx/>
-              <a:buNone/>
-              <a:tabLst/>
-            </a:pPr>
-            <a:r>
-              <a:rPr kumimoji="0" lang="en-US" sz="1600" b="0" i="0" u="none" strike="noStrike" cap="none" normalizeH="0" baseline="0" dirty="0" smtClean="0">
-                <a:ln>
-                  <a:noFill/>
-                </a:ln>
-                <a:solidFill>
-                  <a:srgbClr val="000000"/>
-                </a:solidFill>
-                <a:effectLst/>
-                <a:latin typeface="Consolas" panose="020B0609020204030204" pitchFamily="49" charset="0"/>
-                <a:cs typeface="Consolas" panose="020B0609020204030204" pitchFamily="49" charset="0"/>
-              </a:rPr>
-              <a:t>    {</a:t>
-            </a:r>
-          </a:p>
-          <a:p>
-            <a:pPr marL="0" marR="0" lvl="0" indent="0" algn="l" defTabSz="914400" rtl="0" eaLnBrk="0" fontAlgn="base" latinLnBrk="0" hangingPunct="0">
-              <a:lnSpc>
-                <a:spcPct val="100000"/>
-              </a:lnSpc>
-              <a:spcBef>
-                <a:spcPct val="0"/>
-              </a:spcBef>
-              <a:spcAft>
-                <a:spcPct val="0"/>
-              </a:spcAft>
-              <a:buClrTx/>
-              <a:buSzTx/>
-              <a:buFontTx/>
-              <a:buNone/>
-              <a:tabLst/>
-            </a:pPr>
-            <a:r>
-              <a:rPr kumimoji="0" lang="en-US" sz="1600" b="0" i="0" u="none" strike="noStrike" cap="none" normalizeH="0" baseline="0" dirty="0" smtClean="0">
-                <a:ln>
-                  <a:noFill/>
-                </a:ln>
-                <a:solidFill>
-                  <a:srgbClr val="000000"/>
-                </a:solidFill>
-                <a:effectLst/>
-                <a:latin typeface="Consolas" panose="020B0609020204030204" pitchFamily="49" charset="0"/>
-                <a:cs typeface="Consolas" panose="020B0609020204030204" pitchFamily="49" charset="0"/>
-              </a:rPr>
-              <a:t>        </a:t>
-            </a:r>
-            <a:r>
-              <a:rPr kumimoji="0" lang="en-US" sz="1600" b="0" i="0" u="none" strike="noStrike" cap="none" normalizeH="0" baseline="0" dirty="0" smtClean="0">
-                <a:ln>
-                  <a:noFill/>
-                </a:ln>
-                <a:solidFill>
-                  <a:srgbClr val="008000"/>
-                </a:solidFill>
-                <a:effectLst/>
-                <a:latin typeface="Consolas" panose="020B0609020204030204" pitchFamily="49" charset="0"/>
-                <a:cs typeface="Consolas" panose="020B0609020204030204" pitchFamily="49" charset="0"/>
-              </a:rPr>
-              <a:t>//do something with </a:t>
-            </a:r>
-            <a:r>
-              <a:rPr kumimoji="0" lang="en-US" sz="1600" b="0" i="0" u="none" strike="noStrike" cap="none" normalizeH="0" baseline="0" dirty="0" err="1" smtClean="0">
-                <a:ln>
-                  <a:noFill/>
-                </a:ln>
-                <a:solidFill>
-                  <a:srgbClr val="008000"/>
-                </a:solidFill>
-                <a:effectLst/>
-                <a:latin typeface="Consolas" panose="020B0609020204030204" pitchFamily="49" charset="0"/>
-                <a:cs typeface="Consolas" panose="020B0609020204030204" pitchFamily="49" charset="0"/>
-              </a:rPr>
-              <a:t>iLoc</a:t>
-            </a:r>
-            <a:endParaRPr kumimoji="0" lang="en-US" sz="1600" b="0" i="0" u="none" strike="noStrike" cap="none" normalizeH="0" baseline="0" dirty="0" smtClean="0">
-              <a:ln>
-                <a:noFill/>
-              </a:ln>
-              <a:solidFill>
-                <a:srgbClr val="008000"/>
-              </a:solidFill>
-              <a:effectLst/>
-              <a:latin typeface="Consolas" panose="020B0609020204030204" pitchFamily="49" charset="0"/>
-              <a:cs typeface="Consolas" panose="020B0609020204030204" pitchFamily="49" charset="0"/>
-            </a:endParaRPr>
-          </a:p>
-          <a:p>
-            <a:pPr marL="0" marR="0" lvl="0" indent="0" algn="l" defTabSz="914400" rtl="0" eaLnBrk="0" fontAlgn="base" latinLnBrk="0" hangingPunct="0">
-              <a:lnSpc>
-                <a:spcPct val="100000"/>
-              </a:lnSpc>
-              <a:spcBef>
-                <a:spcPct val="0"/>
-              </a:spcBef>
-              <a:spcAft>
-                <a:spcPct val="0"/>
-              </a:spcAft>
-              <a:buClrTx/>
-              <a:buSzTx/>
-              <a:buFontTx/>
-              <a:buNone/>
-              <a:tabLst/>
-            </a:pPr>
-            <a:r>
-              <a:rPr lang="en-US" sz="1600" dirty="0" smtClean="0">
-                <a:solidFill>
-                  <a:srgbClr val="008000"/>
-                </a:solidFill>
-                <a:latin typeface="Consolas" panose="020B0609020204030204" pitchFamily="49" charset="0"/>
-                <a:cs typeface="Consolas" panose="020B0609020204030204" pitchFamily="49" charset="0"/>
-              </a:rPr>
-              <a:t>        //</a:t>
-            </a:r>
-            <a:r>
-              <a:rPr kumimoji="0" lang="en-US" sz="1600" b="0" i="0" u="none" strike="noStrike" cap="none" normalizeH="0" baseline="0" dirty="0" smtClean="0">
-                <a:ln>
-                  <a:noFill/>
-                </a:ln>
-                <a:solidFill>
-                  <a:srgbClr val="008000"/>
-                </a:solidFill>
-                <a:effectLst/>
-                <a:latin typeface="Consolas" panose="020B0609020204030204" pitchFamily="49" charset="0"/>
-                <a:cs typeface="Consolas" panose="020B0609020204030204" pitchFamily="49" charset="0"/>
-              </a:rPr>
-              <a:t>in another thread (probably)</a:t>
-            </a:r>
-          </a:p>
-          <a:p>
-            <a:pPr marL="0" marR="0" lvl="0" indent="0" algn="l" defTabSz="914400" rtl="0" eaLnBrk="0" fontAlgn="base" latinLnBrk="0" hangingPunct="0">
-              <a:lnSpc>
-                <a:spcPct val="100000"/>
-              </a:lnSpc>
-              <a:spcBef>
-                <a:spcPct val="0"/>
-              </a:spcBef>
-              <a:spcAft>
-                <a:spcPct val="0"/>
-              </a:spcAft>
-              <a:buClrTx/>
-              <a:buSzTx/>
-              <a:buFontTx/>
-              <a:buNone/>
-              <a:tabLst/>
-            </a:pPr>
-            <a:r>
-              <a:rPr kumimoji="0" lang="en-US" sz="1600" b="0" i="0" u="none" strike="noStrike" cap="none" normalizeH="0" baseline="0" dirty="0" smtClean="0">
-                <a:ln>
-                  <a:noFill/>
-                </a:ln>
-                <a:solidFill>
-                  <a:srgbClr val="000000"/>
-                </a:solidFill>
-                <a:effectLst/>
-                <a:latin typeface="Consolas" panose="020B0609020204030204" pitchFamily="49" charset="0"/>
-                <a:cs typeface="Consolas" panose="020B0609020204030204" pitchFamily="49" charset="0"/>
-              </a:rPr>
-              <a:t>    }));</a:t>
-            </a:r>
-          </a:p>
-          <a:p>
-            <a:pPr marL="0" marR="0" lvl="0" indent="0" algn="l" defTabSz="914400" rtl="0" eaLnBrk="0" fontAlgn="base" latinLnBrk="0" hangingPunct="0">
-              <a:lnSpc>
-                <a:spcPct val="100000"/>
-              </a:lnSpc>
-              <a:spcBef>
-                <a:spcPct val="0"/>
-              </a:spcBef>
-              <a:spcAft>
-                <a:spcPct val="0"/>
-              </a:spcAft>
-              <a:buClrTx/>
-              <a:buSzTx/>
-              <a:buFontTx/>
-              <a:buNone/>
-              <a:tabLst/>
-            </a:pPr>
-            <a:r>
-              <a:rPr kumimoji="0" lang="en-US" sz="1600" b="0" i="0" u="none" strike="noStrike" cap="none" normalizeH="0" baseline="0" dirty="0" smtClean="0">
-                <a:ln>
-                  <a:noFill/>
-                </a:ln>
-                <a:solidFill>
-                  <a:srgbClr val="000000"/>
-                </a:solidFill>
-                <a:effectLst/>
-                <a:latin typeface="Consolas" panose="020B0609020204030204" pitchFamily="49" charset="0"/>
-                <a:cs typeface="Consolas" panose="020B0609020204030204" pitchFamily="49" charset="0"/>
-              </a:rPr>
-              <a:t>}</a:t>
-            </a:r>
-          </a:p>
-          <a:p>
-            <a:pPr marL="0" marR="0" lvl="0" indent="0" algn="l" defTabSz="914400" rtl="0" eaLnBrk="0" fontAlgn="base" latinLnBrk="0" hangingPunct="0">
-              <a:lnSpc>
-                <a:spcPct val="100000"/>
-              </a:lnSpc>
-              <a:spcBef>
-                <a:spcPct val="0"/>
-              </a:spcBef>
-              <a:spcAft>
-                <a:spcPct val="0"/>
-              </a:spcAft>
-              <a:buClrTx/>
-              <a:buSzTx/>
-              <a:buFontTx/>
-              <a:buNone/>
-              <a:tabLst/>
-            </a:pPr>
-            <a:r>
-              <a:rPr kumimoji="0" lang="en-US" sz="1600" b="0" i="0" u="none" strike="noStrike" cap="none" normalizeH="0" baseline="0" dirty="0" err="1" smtClean="0">
-                <a:ln>
-                  <a:noFill/>
-                </a:ln>
-                <a:solidFill>
-                  <a:srgbClr val="2B91AF"/>
-                </a:solidFill>
-                <a:effectLst/>
-                <a:latin typeface="Consolas" panose="020B0609020204030204" pitchFamily="49" charset="0"/>
-                <a:cs typeface="Consolas" panose="020B0609020204030204" pitchFamily="49" charset="0"/>
-              </a:rPr>
-              <a:t>Task</a:t>
-            </a:r>
-            <a:r>
-              <a:rPr kumimoji="0" lang="en-US" sz="1600" b="0" i="0" u="none" strike="noStrike" cap="none" normalizeH="0" baseline="0" dirty="0" err="1" smtClean="0">
-                <a:ln>
-                  <a:noFill/>
-                </a:ln>
-                <a:solidFill>
-                  <a:srgbClr val="000000"/>
-                </a:solidFill>
-                <a:effectLst/>
-                <a:latin typeface="Consolas" panose="020B0609020204030204" pitchFamily="49" charset="0"/>
-                <a:cs typeface="Consolas" panose="020B0609020204030204" pitchFamily="49" charset="0"/>
-              </a:rPr>
-              <a:t>.WaitAll</a:t>
-            </a:r>
-            <a:r>
-              <a:rPr kumimoji="0" lang="en-US" sz="1600" b="0" i="0" u="none" strike="noStrike" cap="none" normalizeH="0" baseline="0" dirty="0" smtClean="0">
-                <a:ln>
-                  <a:noFill/>
-                </a:ln>
-                <a:solidFill>
-                  <a:srgbClr val="000000"/>
-                </a:solidFill>
-                <a:effectLst/>
-                <a:latin typeface="Consolas" panose="020B0609020204030204" pitchFamily="49" charset="0"/>
-                <a:cs typeface="Consolas" panose="020B0609020204030204" pitchFamily="49" charset="0"/>
-              </a:rPr>
-              <a:t>(</a:t>
-            </a:r>
-            <a:r>
-              <a:rPr kumimoji="0" lang="en-US" sz="1600" b="0" i="0" u="none" strike="noStrike" cap="none" normalizeH="0" baseline="0" dirty="0" err="1" smtClean="0">
-                <a:ln>
-                  <a:noFill/>
-                </a:ln>
-                <a:solidFill>
-                  <a:srgbClr val="000000"/>
-                </a:solidFill>
-                <a:effectLst/>
-                <a:latin typeface="Consolas" panose="020B0609020204030204" pitchFamily="49" charset="0"/>
-                <a:cs typeface="Consolas" panose="020B0609020204030204" pitchFamily="49" charset="0"/>
-              </a:rPr>
-              <a:t>tasks.ToArray</a:t>
-            </a:r>
-            <a:r>
-              <a:rPr kumimoji="0" lang="en-US" sz="1600" b="0" i="0" u="none" strike="noStrike" cap="none" normalizeH="0" baseline="0" dirty="0" smtClean="0">
-                <a:ln>
-                  <a:noFill/>
-                </a:ln>
-                <a:solidFill>
-                  <a:srgbClr val="000000"/>
-                </a:solidFill>
-                <a:effectLst/>
-                <a:latin typeface="Consolas" panose="020B0609020204030204" pitchFamily="49" charset="0"/>
-                <a:cs typeface="Consolas" panose="020B0609020204030204" pitchFamily="49" charset="0"/>
-              </a:rPr>
-              <a:t>()); </a:t>
-            </a:r>
-            <a:endParaRPr kumimoji="0" lang="en-US" sz="3600" b="0" i="0" u="none" strike="noStrike" cap="none" normalizeH="0" baseline="0" dirty="0" smtClean="0">
-              <a:ln>
-                <a:noFill/>
-              </a:ln>
-              <a:solidFill>
-                <a:schemeClr val="tx1"/>
-              </a:solidFill>
-              <a:effectLst/>
-              <a:latin typeface="Arial" panose="020B0604020202020204" pitchFamily="34" charset="0"/>
-            </a:endParaRPr>
           </a:p>
         </p:txBody>
       </p:sp>
     </p:spTree>
     <p:extLst>
       <p:ext uri="{BB962C8B-B14F-4D97-AF65-F5344CB8AC3E}">
-        <p14:creationId xmlns:p14="http://schemas.microsoft.com/office/powerpoint/2010/main" val="490043420"/>
+        <p14:creationId xmlns:p14="http://schemas.microsoft.com/office/powerpoint/2010/main" val="2527456564"/>
       </p:ext>
     </p:extLst>
   </p:cSld>
@@ -8050,11 +6667,19 @@
             </a:r>
             <a:r>
               <a:rPr lang="en-US" sz="4000" dirty="0" err="1" smtClean="0"/>
-              <a:t>.GetLimitsOfParallelism</a:t>
+              <a:t>.GoTo</a:t>
             </a:r>
             <a:r>
               <a:rPr lang="en-US" sz="4000" dirty="0" smtClean="0"/>
-              <a:t>()</a:t>
+              <a:t>(</a:t>
+            </a:r>
+            <a:r>
+              <a:rPr lang="en-US" sz="4000" dirty="0" err="1" smtClean="0"/>
+              <a:t>VisualStudio</a:t>
+            </a:r>
+            <a:r>
+              <a:rPr lang="en-US" sz="4000" dirty="0" smtClean="0"/>
+              <a:t>)</a:t>
             </a:r>
             <a:endParaRPr sz="4000" dirty="0"/>
           </a:p>
@@ -8073,72 +6698,43 @@
         <p:spPr/>
         <p:txBody>
           <a:bodyPr>
-            <a:normAutofit lnSpcReduction="10000"/>
+            <a:normAutofit/>
           </a:bodyPr>
           <a:lstStyle/>
           <a:p>
             <a:r>
-              <a:rPr lang="en-US" sz="3600" dirty="0"/>
-              <a:t>Big </a:t>
-            </a:r>
-            <a:r>
-              <a:rPr lang="en-US" sz="3600" dirty="0" smtClean="0"/>
-              <a:t>Iron – single </a:t>
-            </a:r>
-            <a:r>
-              <a:rPr lang="en-US" sz="3600" dirty="0"/>
-              <a:t>point of failure</a:t>
+              <a:rPr lang="en-US" sz="3400" dirty="0" smtClean="0"/>
+              <a:t>Write code to take a URL</a:t>
             </a:r>
           </a:p>
           <a:p>
             <a:pPr lvl="1"/>
             <a:r>
-              <a:rPr lang="en-US" sz="3400" dirty="0" smtClean="0"/>
-              <a:t>Silicon limits (CPU, RAM)</a:t>
-            </a:r>
-            <a:endParaRPr lang="en-US" sz="3400" dirty="0"/>
+              <a:rPr lang="en-US" sz="3200" dirty="0" smtClean="0"/>
+              <a:t>Get time in MS to receive response</a:t>
+            </a:r>
           </a:p>
           <a:p>
             <a:pPr lvl="1"/>
             <a:r>
-              <a:rPr lang="en-US" sz="3400" dirty="0" smtClean="0"/>
-              <a:t>I/O limits (storage, network)</a:t>
-            </a:r>
-            <a:endParaRPr lang="en-US" sz="3400" dirty="0"/>
-          </a:p>
-          <a:p>
-            <a:r>
-              <a:rPr lang="en-US" sz="3600" dirty="0" smtClean="0"/>
-              <a:t>Proximity Problem</a:t>
+              <a:rPr lang="en-US" sz="3200" dirty="0" smtClean="0"/>
+              <a:t>Get time in MS to read response from stream</a:t>
             </a:r>
           </a:p>
           <a:p>
             <a:pPr lvl="1"/>
             <a:r>
-              <a:rPr lang="en-US" sz="3400" dirty="0" smtClean="0"/>
-              <a:t>Data sources are distributed</a:t>
-            </a:r>
-          </a:p>
-          <a:p>
-            <a:pPr lvl="1"/>
-            <a:r>
-              <a:rPr lang="en-US" sz="3400" dirty="0" smtClean="0"/>
-              <a:t>Process your UK logs in the UK</a:t>
-            </a:r>
-          </a:p>
-          <a:p>
-            <a:r>
-              <a:rPr lang="en-US" sz="3600" dirty="0" smtClean="0"/>
-              <a:t>Others?</a:t>
-            </a:r>
-            <a:endParaRPr lang="en-US" sz="3600" dirty="0" smtClean="0"/>
+              <a:rPr lang="en-US" sz="3200" dirty="0" smtClean="0"/>
+              <a:t>Write the results</a:t>
+            </a:r>
+            <a:endParaRPr lang="en-US" sz="3200" dirty="0"/>
           </a:p>
         </p:txBody>
       </p:sp>
     </p:spTree>
     <p:extLst>
       <p:ext uri="{BB962C8B-B14F-4D97-AF65-F5344CB8AC3E}">
-        <p14:creationId xmlns:p14="http://schemas.microsoft.com/office/powerpoint/2010/main" val="2502052837"/>
+        <p14:creationId xmlns:p14="http://schemas.microsoft.com/office/powerpoint/2010/main" val="1608067758"/>
       </p:ext>
     </p:extLst>
   </p:cSld>
@@ -8207,7 +6803,11 @@
             </a:r>
             <a:r>
               <a:rPr lang="en-US" sz="4000" dirty="0" err="1" smtClean="0"/>
-              <a:t>.DistributedParallelHard</a:t>
+              <a:t>.DoSprint</a:t>
+            </a:r>
+            <a:r>
+              <a:rPr lang="en-US" sz="4000" dirty="0" smtClean="0"/>
+              <a:t>(2)</a:t>
             </a:r>
             <a:endParaRPr sz="4000" dirty="0"/>
           </a:p>
@@ -8226,65 +6826,55 @@
         <p:spPr/>
         <p:txBody>
           <a:bodyPr>
-            <a:normAutofit lnSpcReduction="10000"/>
+            <a:normAutofit/>
           </a:bodyPr>
           <a:lstStyle/>
           <a:p>
             <a:r>
               <a:rPr lang="en-US" sz="3600" dirty="0" smtClean="0"/>
-              <a:t>Hadoop &amp; MS HPC</a:t>
-            </a:r>
-            <a:endParaRPr lang="en-US" sz="3600" dirty="0"/>
+              <a:t>As a boss</a:t>
+            </a:r>
+          </a:p>
+          <a:p>
+            <a:r>
+              <a:rPr lang="en-US" sz="3600" dirty="0" smtClean="0"/>
+              <a:t>I want the same performance data </a:t>
+            </a:r>
           </a:p>
           <a:p>
             <a:pPr lvl="1"/>
             <a:r>
               <a:rPr lang="en-US" sz="3400" dirty="0" smtClean="0"/>
-              <a:t>It’s a cluster</a:t>
+              <a:t>on these 10 web pages</a:t>
+            </a:r>
+          </a:p>
+          <a:p>
+            <a:r>
+              <a:rPr lang="en-US" sz="3600" dirty="0" smtClean="0"/>
+              <a:t>So that I can make some charts and graphs</a:t>
+            </a:r>
+          </a:p>
+          <a:p>
+            <a:pPr lvl="1"/>
+            <a:r>
+              <a:rPr lang="en-US" sz="3400" dirty="0" smtClean="0"/>
+              <a:t>To impress the board, and</a:t>
+            </a:r>
+          </a:p>
+          <a:p>
+            <a:pPr lvl="1"/>
+            <a:r>
+              <a:rPr lang="en-US" sz="3400" dirty="0" smtClean="0"/>
+              <a:t>To satisfy my boss</a:t>
             </a:r>
             <a:endParaRPr lang="en-US" sz="3400" dirty="0"/>
-          </a:p>
-          <a:p>
-            <a:pPr lvl="1"/>
-            <a:r>
-              <a:rPr lang="en-US" sz="3400" dirty="0" smtClean="0"/>
-              <a:t>Awkward, tricky, complicated</a:t>
-            </a:r>
-            <a:endParaRPr lang="en-US" sz="3400" dirty="0"/>
-          </a:p>
-          <a:p>
-            <a:r>
-              <a:rPr lang="en-US" sz="3600" dirty="0" smtClean="0"/>
-              <a:t>DuoVia.MpiVisor</a:t>
-            </a:r>
-          </a:p>
-          <a:p>
-            <a:pPr lvl="1"/>
-            <a:r>
-              <a:rPr lang="en-US" sz="3400" dirty="0" smtClean="0"/>
-              <a:t>Better, less tricky, less complicated</a:t>
-            </a:r>
-          </a:p>
-          <a:p>
-            <a:pPr lvl="1"/>
-            <a:r>
-              <a:rPr lang="en-US" sz="3400" dirty="0" smtClean="0"/>
-              <a:t>Not easy enough</a:t>
-            </a:r>
-          </a:p>
-          <a:p>
-            <a:r>
-              <a:rPr lang="en-US" sz="3600" dirty="0" smtClean="0"/>
-              <a:t>Others?</a:t>
-            </a:r>
-            <a:endParaRPr lang="en-US" sz="3600" dirty="0" smtClean="0"/>
           </a:p>
         </p:txBody>
       </p:sp>
     </p:spTree>
     <p:extLst>
       <p:ext uri="{BB962C8B-B14F-4D97-AF65-F5344CB8AC3E}">
-        <p14:creationId xmlns:p14="http://schemas.microsoft.com/office/powerpoint/2010/main" val="3708070906"/>
+        <p14:creationId xmlns:p14="http://schemas.microsoft.com/office/powerpoint/2010/main" val="2105835353"/>
       </p:ext>
     </p:extLst>
   </p:cSld>
@@ -8353,7 +6943,19 @@
             </a:r>
             <a:r>
               <a:rPr lang="en-US" sz="4000" dirty="0" err="1" smtClean="0"/>
-              <a:t>.DistributedParallelEasy</a:t>
+              <a:t>.GoTo</a:t>
+            </a:r>
+            <a:r>
+              <a:rPr lang="en-US" sz="4000" dirty="0" smtClean="0"/>
+              <a:t>(</a:t>
+            </a:r>
+            <a:r>
+              <a:rPr lang="en-US" sz="4000" dirty="0" err="1" smtClean="0"/>
+              <a:t>VisualStudio</a:t>
+            </a:r>
+            <a:r>
+              <a:rPr lang="en-US" sz="4000" dirty="0" smtClean="0"/>
+              <a:t>)</a:t>
             </a:r>
             <a:endParaRPr sz="4000" dirty="0"/>
           </a:p>
@@ -8377,967 +6979,43 @@
           <a:lstStyle/>
           <a:p>
             <a:r>
-              <a:rPr lang="en-US" sz="3600" dirty="0" smtClean="0"/>
-              <a:t>DuoVia.Net.Distributed</a:t>
-            </a:r>
-            <a:endParaRPr lang="en-US" sz="3600" dirty="0"/>
-          </a:p>
-        </p:txBody>
-      </p:sp>
-      <p:sp>
-        <p:nvSpPr>
-          <p:cNvPr id="2" name="Rectangle 1"/>
-          <p:cNvSpPr>
-            <a:spLocks noChangeArrowheads="1"/>
-          </p:cNvSpPr>
-          <p:nvPr/>
-        </p:nvSpPr>
-        <p:spPr bwMode="auto">
-          <a:xfrm>
-            <a:off x="1905000" y="2592288"/>
-            <a:ext cx="9960293" cy="3785652"/>
-          </a:xfrm>
-          <a:prstGeom prst="rect">
-            <a:avLst/>
-          </a:prstGeom>
-          <a:solidFill>
-            <a:srgbClr val="FFFFFF"/>
-          </a:solidFill>
-          <a:ln>
-            <a:noFill/>
-          </a:ln>
-          <a:effectLst/>
-          <a:extLst>
-            <a:ext uri="{91240B29-F687-4F45-9708-019B960494DF}">
-              <a14:hiddenLine xmlns:a14="http://schemas.microsoft.com/office/drawing/2010/main" w="9525">
+              <a:rPr lang="en-US" sz="3400" dirty="0" smtClean="0"/>
+              <a:t>Write code to add URL array</a:t>
+            </a:r>
+          </a:p>
+          <a:p>
+            <a:r>
+              <a:rPr lang="en-US" sz="3400" dirty="0" smtClean="0"/>
+              <a:t>Write </a:t>
+            </a:r>
+            <a:r>
+              <a:rPr lang="en-US" sz="3400" dirty="0" err="1" smtClean="0">
                 <a:solidFill>
-                  <a:schemeClr val="tx1"/>
+                  <a:srgbClr val="00B0F0"/>
                 </a:solidFill>
-                <a:miter lim="800000"/>
-                <a:headEnd/>
-                <a:tailEnd/>
-              </a14:hiddenLine>
-            </a:ext>
-            <a:ext uri="{AF507438-7753-43E0-B8FC-AC1667EBCBE1}">
-              <a14:hiddenEffects xmlns:a14="http://schemas.microsoft.com/office/drawing/2010/main">
-                <a:effectLst>
-                  <a:outerShdw dist="35921" dir="2700000" algn="ctr" rotWithShape="0">
-                    <a:schemeClr val="bg2"/>
-                  </a:outerShdw>
-                </a:effectLst>
-              </a14:hiddenEffects>
-            </a:ext>
-          </a:extLst>
-        </p:spPr>
-        <p:txBody>
-          <a:bodyPr vert="horz" wrap="square" lIns="91440" tIns="45720" rIns="91440" bIns="45720" numCol="1" anchor="ctr" anchorCtr="0" compatLnSpc="1">
-            <a:prstTxWarp prst="textNoShape">
-              <a:avLst/>
-            </a:prstTxWarp>
-            <a:spAutoFit/>
-          </a:bodyPr>
-          <a:lstStyle/>
-          <a:p>
-            <a:pPr lvl="0" eaLnBrk="0" fontAlgn="base" hangingPunct="0">
-              <a:spcBef>
-                <a:spcPct val="0"/>
-              </a:spcBef>
-              <a:spcAft>
-                <a:spcPct val="0"/>
-              </a:spcAft>
-            </a:pPr>
-            <a:r>
-              <a:rPr kumimoji="0" lang="en-US" sz="2000" b="0" i="0" u="none" strike="noStrike" cap="none" normalizeH="0" baseline="0" dirty="0" smtClean="0">
-                <a:ln>
-                  <a:noFill/>
-                </a:ln>
-                <a:solidFill>
-                  <a:srgbClr val="0000FF"/>
-                </a:solidFill>
-                <a:effectLst/>
-                <a:latin typeface="Consolas" panose="020B0609020204030204" pitchFamily="49" charset="0"/>
-                <a:cs typeface="Consolas" panose="020B0609020204030204" pitchFamily="49" charset="0"/>
               </a:rPr>
-              <a:t>using</a:t>
-            </a:r>
-            <a:r>
-              <a:rPr kumimoji="0" lang="en-US" sz="2000" b="0" i="0" u="none" strike="noStrike" cap="none" normalizeH="0" baseline="0" dirty="0" smtClean="0">
-                <a:ln>
-                  <a:noFill/>
-                </a:ln>
-                <a:solidFill>
-                  <a:srgbClr val="000000"/>
-                </a:solidFill>
-                <a:effectLst/>
-                <a:latin typeface="Consolas" panose="020B0609020204030204" pitchFamily="49" charset="0"/>
-                <a:cs typeface="Consolas" panose="020B0609020204030204" pitchFamily="49" charset="0"/>
-              </a:rPr>
-              <a:t> (</a:t>
-            </a:r>
-            <a:r>
-              <a:rPr lang="en-US" sz="2000" dirty="0" err="1" smtClean="0">
-                <a:solidFill>
-                  <a:srgbClr val="0000FF"/>
-                </a:solidFill>
-                <a:latin typeface="Consolas" panose="020B0609020204030204" pitchFamily="49" charset="0"/>
-                <a:cs typeface="Consolas" panose="020B0609020204030204" pitchFamily="49" charset="0"/>
-              </a:rPr>
-              <a:t>var</a:t>
-            </a:r>
-            <a:r>
-              <a:rPr kumimoji="0" lang="en-US" sz="2000" b="0" i="0" u="none" strike="noStrike" cap="none" normalizeH="0" baseline="0" dirty="0" smtClean="0">
-                <a:ln>
-                  <a:noFill/>
-                </a:ln>
-                <a:solidFill>
-                  <a:srgbClr val="000000"/>
-                </a:solidFill>
-                <a:effectLst/>
-                <a:latin typeface="Consolas" panose="020B0609020204030204" pitchFamily="49" charset="0"/>
-                <a:cs typeface="Consolas" panose="020B0609020204030204" pitchFamily="49" charset="0"/>
-              </a:rPr>
-              <a:t> client = </a:t>
-            </a:r>
-            <a:r>
-              <a:rPr kumimoji="0" lang="en-US" sz="2000" b="0" i="0" u="none" strike="noStrike" cap="none" normalizeH="0" baseline="0" dirty="0" err="1" smtClean="0">
-                <a:ln>
-                  <a:noFill/>
-                </a:ln>
-                <a:solidFill>
-                  <a:srgbClr val="2B91AF"/>
-                </a:solidFill>
-                <a:effectLst/>
-                <a:latin typeface="Consolas" panose="020B0609020204030204" pitchFamily="49" charset="0"/>
-                <a:cs typeface="Consolas" panose="020B0609020204030204" pitchFamily="49" charset="0"/>
-              </a:rPr>
-              <a:t>Distributor</a:t>
-            </a:r>
-            <a:r>
-              <a:rPr kumimoji="0" lang="en-US" sz="2000" b="0" i="0" u="none" strike="noStrike" cap="none" normalizeH="0" baseline="0" dirty="0" err="1" smtClean="0">
-                <a:ln>
-                  <a:noFill/>
-                </a:ln>
-                <a:solidFill>
-                  <a:srgbClr val="000000"/>
-                </a:solidFill>
-                <a:effectLst/>
-                <a:latin typeface="Consolas" panose="020B0609020204030204" pitchFamily="49" charset="0"/>
-                <a:cs typeface="Consolas" panose="020B0609020204030204" pitchFamily="49" charset="0"/>
-              </a:rPr>
-              <a:t>.Connect</a:t>
-            </a:r>
-            <a:r>
-              <a:rPr kumimoji="0" lang="en-US" sz="2000" b="0" i="0" u="none" strike="noStrike" cap="none" normalizeH="0" baseline="0" dirty="0" smtClean="0">
-                <a:ln>
-                  <a:noFill/>
-                </a:ln>
-                <a:solidFill>
-                  <a:srgbClr val="000000"/>
-                </a:solidFill>
-                <a:effectLst/>
-                <a:latin typeface="Consolas" panose="020B0609020204030204" pitchFamily="49" charset="0"/>
-                <a:cs typeface="Consolas" panose="020B0609020204030204" pitchFamily="49" charset="0"/>
-              </a:rPr>
-              <a:t>&lt;</a:t>
-            </a:r>
-            <a:r>
-              <a:rPr kumimoji="0" lang="en-US" sz="2000" b="0" i="0" u="none" strike="noStrike" cap="none" normalizeH="0" baseline="0" dirty="0" err="1" smtClean="0">
-                <a:ln>
-                  <a:noFill/>
-                </a:ln>
-                <a:solidFill>
-                  <a:srgbClr val="2B91AF"/>
-                </a:solidFill>
-                <a:effectLst/>
-                <a:latin typeface="Consolas" panose="020B0609020204030204" pitchFamily="49" charset="0"/>
-                <a:cs typeface="Consolas" panose="020B0609020204030204" pitchFamily="49" charset="0"/>
-              </a:rPr>
-              <a:t>ITest</a:t>
-            </a:r>
-            <a:r>
-              <a:rPr kumimoji="0" lang="en-US" sz="2000" b="0" i="0" u="none" strike="noStrike" cap="none" normalizeH="0" baseline="0" dirty="0" smtClean="0">
-                <a:ln>
-                  <a:noFill/>
-                </a:ln>
-                <a:solidFill>
-                  <a:srgbClr val="000000"/>
-                </a:solidFill>
-                <a:effectLst/>
-                <a:latin typeface="Consolas" panose="020B0609020204030204" pitchFamily="49" charset="0"/>
-                <a:cs typeface="Consolas" panose="020B0609020204030204" pitchFamily="49" charset="0"/>
-              </a:rPr>
-              <a:t>&gt;(</a:t>
-            </a:r>
-            <a:r>
-              <a:rPr kumimoji="0" lang="en-US" sz="2000" b="0" i="0" u="none" strike="noStrike" cap="none" normalizeH="0" baseline="0" dirty="0" smtClean="0">
-                <a:ln>
-                  <a:noFill/>
-                </a:ln>
-                <a:solidFill>
-                  <a:srgbClr val="0000FF"/>
-                </a:solidFill>
-                <a:effectLst/>
-                <a:latin typeface="Consolas" panose="020B0609020204030204" pitchFamily="49" charset="0"/>
-                <a:cs typeface="Consolas" panose="020B0609020204030204" pitchFamily="49" charset="0"/>
-              </a:rPr>
-              <a:t>...</a:t>
-            </a:r>
-            <a:r>
-              <a:rPr lang="en-US" sz="2000" dirty="0" smtClean="0">
-                <a:solidFill>
-                  <a:srgbClr val="000000"/>
-                </a:solidFill>
-                <a:latin typeface="Consolas" panose="020B0609020204030204" pitchFamily="49" charset="0"/>
-                <a:cs typeface="Consolas" panose="020B0609020204030204" pitchFamily="49" charset="0"/>
-              </a:rPr>
-              <a:t>, </a:t>
-            </a:r>
-            <a:r>
-              <a:rPr lang="en-US" sz="2000" dirty="0" err="1" smtClean="0">
-                <a:solidFill>
-                  <a:srgbClr val="000000"/>
-                </a:solidFill>
-                <a:latin typeface="Consolas" panose="020B0609020204030204" pitchFamily="49" charset="0"/>
-                <a:cs typeface="Consolas" panose="020B0609020204030204" pitchFamily="49" charset="0"/>
-              </a:rPr>
-              <a:t>ipEndPoints</a:t>
-            </a:r>
-            <a:r>
-              <a:rPr lang="en-US" sz="2000" dirty="0" smtClean="0">
-                <a:solidFill>
-                  <a:srgbClr val="000000"/>
-                </a:solidFill>
-                <a:latin typeface="Consolas" panose="020B0609020204030204" pitchFamily="49" charset="0"/>
-                <a:cs typeface="Consolas" panose="020B0609020204030204" pitchFamily="49" charset="0"/>
-              </a:rPr>
-              <a:t>)</a:t>
-            </a:r>
-            <a:r>
-              <a:rPr kumimoji="0" lang="en-US" sz="2000" b="0" i="0" u="none" strike="noStrike" cap="none" normalizeH="0" baseline="0" dirty="0" smtClean="0">
-                <a:ln>
-                  <a:noFill/>
-                </a:ln>
-                <a:solidFill>
-                  <a:srgbClr val="000000"/>
-                </a:solidFill>
-                <a:effectLst/>
-                <a:latin typeface="Consolas" panose="020B0609020204030204" pitchFamily="49" charset="0"/>
-                <a:cs typeface="Consolas" panose="020B0609020204030204" pitchFamily="49" charset="0"/>
-              </a:rPr>
-              <a:t> </a:t>
-            </a:r>
-          </a:p>
-          <a:p>
-            <a:pPr marL="0" marR="0" lvl="0" indent="0" algn="l" defTabSz="914400" rtl="0" eaLnBrk="0" fontAlgn="base" latinLnBrk="0" hangingPunct="0">
-              <a:lnSpc>
-                <a:spcPct val="100000"/>
-              </a:lnSpc>
-              <a:spcBef>
-                <a:spcPct val="0"/>
-              </a:spcBef>
-              <a:spcAft>
-                <a:spcPct val="0"/>
-              </a:spcAft>
-              <a:buClrTx/>
-              <a:buSzTx/>
-              <a:buFontTx/>
-              <a:buNone/>
-              <a:tabLst/>
-            </a:pPr>
-            <a:r>
-              <a:rPr kumimoji="0" lang="en-US" sz="2000" b="0" i="0" u="none" strike="noStrike" cap="none" normalizeH="0" baseline="0" dirty="0" smtClean="0">
-                <a:ln>
-                  <a:noFill/>
-                </a:ln>
-                <a:solidFill>
-                  <a:srgbClr val="000000"/>
-                </a:solidFill>
-                <a:effectLst/>
-                <a:latin typeface="Consolas" panose="020B0609020204030204" pitchFamily="49" charset="0"/>
-                <a:cs typeface="Consolas" panose="020B0609020204030204" pitchFamily="49" charset="0"/>
-              </a:rPr>
-              <a:t>{</a:t>
-            </a:r>
-          </a:p>
-          <a:p>
-            <a:pPr marL="0" marR="0" lvl="0" indent="0" algn="l" defTabSz="914400" rtl="0" eaLnBrk="0" fontAlgn="base" latinLnBrk="0" hangingPunct="0">
-              <a:lnSpc>
-                <a:spcPct val="100000"/>
-              </a:lnSpc>
-              <a:spcBef>
-                <a:spcPct val="0"/>
-              </a:spcBef>
-              <a:spcAft>
-                <a:spcPct val="0"/>
-              </a:spcAft>
-              <a:buClrTx/>
-              <a:buSzTx/>
-              <a:buFontTx/>
-              <a:buNone/>
-              <a:tabLst/>
-            </a:pPr>
-            <a:r>
-              <a:rPr kumimoji="0" lang="en-US" sz="2000" b="0" i="0" u="none" strike="noStrike" cap="none" normalizeH="0" baseline="0" dirty="0" smtClean="0">
-                <a:ln>
-                  <a:noFill/>
-                </a:ln>
-                <a:solidFill>
-                  <a:srgbClr val="000000"/>
-                </a:solidFill>
-                <a:effectLst/>
-                <a:latin typeface="Consolas" panose="020B0609020204030204" pitchFamily="49" charset="0"/>
-                <a:cs typeface="Consolas" panose="020B0609020204030204" pitchFamily="49" charset="0"/>
-              </a:rPr>
-              <a:t>  </a:t>
-            </a:r>
-            <a:r>
-              <a:rPr kumimoji="0" lang="en-US" sz="2000" b="0" i="0" u="none" strike="noStrike" cap="none" normalizeH="0" baseline="0" dirty="0" smtClean="0">
-                <a:ln>
-                  <a:noFill/>
-                </a:ln>
-                <a:solidFill>
-                  <a:srgbClr val="008000"/>
-                </a:solidFill>
-                <a:effectLst/>
-                <a:latin typeface="Consolas" panose="020B0609020204030204" pitchFamily="49" charset="0"/>
-                <a:cs typeface="Consolas" panose="020B0609020204030204" pitchFamily="49" charset="0"/>
-              </a:rPr>
-              <a:t>//set state on each node - one call per server node</a:t>
-            </a:r>
-          </a:p>
-          <a:p>
-            <a:pPr marL="0" marR="0" lvl="0" indent="0" algn="l" defTabSz="914400" rtl="0" eaLnBrk="0" fontAlgn="base" latinLnBrk="0" hangingPunct="0">
-              <a:lnSpc>
-                <a:spcPct val="100000"/>
-              </a:lnSpc>
-              <a:spcBef>
-                <a:spcPct val="0"/>
-              </a:spcBef>
-              <a:spcAft>
-                <a:spcPct val="0"/>
-              </a:spcAft>
-              <a:buClrTx/>
-              <a:buSzTx/>
-              <a:buFontTx/>
-              <a:buNone/>
-              <a:tabLst/>
-            </a:pPr>
-            <a:r>
-              <a:rPr kumimoji="0" lang="en-US" sz="2000" b="0" i="0" u="none" strike="noStrike" cap="none" normalizeH="0" baseline="0" dirty="0" smtClean="0">
-                <a:ln>
-                  <a:noFill/>
-                </a:ln>
-                <a:solidFill>
-                  <a:srgbClr val="000000"/>
-                </a:solidFill>
-                <a:effectLst/>
-                <a:latin typeface="Consolas" panose="020B0609020204030204" pitchFamily="49" charset="0"/>
-                <a:cs typeface="Consolas" panose="020B0609020204030204" pitchFamily="49" charset="0"/>
-              </a:rPr>
-              <a:t>   </a:t>
-            </a:r>
-            <a:r>
-              <a:rPr kumimoji="0" lang="en-US" sz="2000" b="0" i="0" u="none" strike="noStrike" cap="none" normalizeH="0" baseline="0" dirty="0" err="1" smtClean="0">
-                <a:ln>
-                  <a:noFill/>
-                </a:ln>
-                <a:solidFill>
-                  <a:srgbClr val="000000"/>
-                </a:solidFill>
-                <a:effectLst/>
-                <a:latin typeface="Consolas" panose="020B0609020204030204" pitchFamily="49" charset="0"/>
-                <a:cs typeface="Consolas" panose="020B0609020204030204" pitchFamily="49" charset="0"/>
-              </a:rPr>
-              <a:t>client.OncePerNode</a:t>
-            </a:r>
-            <a:r>
-              <a:rPr kumimoji="0" lang="en-US" sz="2000" b="0" i="0" u="none" strike="noStrike" cap="none" normalizeH="0" baseline="0" dirty="0" smtClean="0">
-                <a:ln>
-                  <a:noFill/>
-                </a:ln>
-                <a:solidFill>
-                  <a:srgbClr val="000000"/>
-                </a:solidFill>
-                <a:effectLst/>
-                <a:latin typeface="Consolas" panose="020B0609020204030204" pitchFamily="49" charset="0"/>
-                <a:cs typeface="Consolas" panose="020B0609020204030204" pitchFamily="49" charset="0"/>
-              </a:rPr>
-              <a:t>(</a:t>
-            </a:r>
-            <a:r>
-              <a:rPr kumimoji="0" lang="en-US" sz="2000" b="0" i="0" u="none" strike="noStrike" cap="none" normalizeH="0" baseline="0" dirty="0" smtClean="0">
-                <a:ln>
-                  <a:noFill/>
-                </a:ln>
-                <a:solidFill>
-                  <a:srgbClr val="0000FF"/>
-                </a:solidFill>
-                <a:effectLst/>
-                <a:latin typeface="Consolas" panose="020B0609020204030204" pitchFamily="49" charset="0"/>
-                <a:cs typeface="Consolas" panose="020B0609020204030204" pitchFamily="49" charset="0"/>
-              </a:rPr>
-              <a:t>new</a:t>
-            </a:r>
-            <a:r>
-              <a:rPr kumimoji="0" lang="en-US" sz="2000" b="0" i="0" u="none" strike="noStrike" cap="none" normalizeH="0" baseline="0" dirty="0" smtClean="0">
-                <a:ln>
-                  <a:noFill/>
-                </a:ln>
-                <a:solidFill>
-                  <a:srgbClr val="000000"/>
-                </a:solidFill>
-                <a:effectLst/>
-                <a:latin typeface="Consolas" panose="020B0609020204030204" pitchFamily="49" charset="0"/>
-                <a:cs typeface="Consolas" panose="020B0609020204030204" pitchFamily="49" charset="0"/>
-              </a:rPr>
-              <a:t> </a:t>
-            </a:r>
-            <a:r>
-              <a:rPr kumimoji="0" lang="en-US" sz="2000" b="0" i="0" u="none" strike="noStrike" cap="none" normalizeH="0" baseline="0" dirty="0" smtClean="0">
-                <a:ln>
-                  <a:noFill/>
-                </a:ln>
-                <a:solidFill>
-                  <a:srgbClr val="2B91AF"/>
-                </a:solidFill>
-                <a:effectLst/>
-                <a:latin typeface="Consolas" panose="020B0609020204030204" pitchFamily="49" charset="0"/>
-                <a:cs typeface="Consolas" panose="020B0609020204030204" pitchFamily="49" charset="0"/>
-              </a:rPr>
-              <a:t>Tuple</a:t>
-            </a:r>
-            <a:r>
-              <a:rPr kumimoji="0" lang="en-US" sz="2000" b="0" i="0" u="none" strike="noStrike" cap="none" normalizeH="0" baseline="0" dirty="0" smtClean="0">
-                <a:ln>
-                  <a:noFill/>
-                </a:ln>
-                <a:solidFill>
-                  <a:srgbClr val="000000"/>
-                </a:solidFill>
-                <a:effectLst/>
-                <a:latin typeface="Consolas" panose="020B0609020204030204" pitchFamily="49" charset="0"/>
-                <a:cs typeface="Consolas" panose="020B0609020204030204" pitchFamily="49" charset="0"/>
-              </a:rPr>
-              <a:t>&lt;</a:t>
-            </a:r>
-            <a:r>
-              <a:rPr kumimoji="0" lang="en-US" sz="2000" b="0" i="0" u="none" strike="noStrike" cap="none" normalizeH="0" baseline="0" dirty="0" err="1" smtClean="0">
-                <a:ln>
-                  <a:noFill/>
-                </a:ln>
-                <a:solidFill>
-                  <a:srgbClr val="0000FF"/>
-                </a:solidFill>
-                <a:effectLst/>
-                <a:latin typeface="Consolas" panose="020B0609020204030204" pitchFamily="49" charset="0"/>
-                <a:cs typeface="Consolas" panose="020B0609020204030204" pitchFamily="49" charset="0"/>
-              </a:rPr>
-              <a:t>int</a:t>
-            </a:r>
-            <a:r>
-              <a:rPr kumimoji="0" lang="en-US" sz="2000" b="0" i="0" u="none" strike="noStrike" cap="none" normalizeH="0" baseline="0" dirty="0" smtClean="0">
-                <a:ln>
-                  <a:noFill/>
-                </a:ln>
-                <a:solidFill>
-                  <a:srgbClr val="000000"/>
-                </a:solidFill>
-                <a:effectLst/>
-                <a:latin typeface="Consolas" panose="020B0609020204030204" pitchFamily="49" charset="0"/>
-                <a:cs typeface="Consolas" panose="020B0609020204030204" pitchFamily="49" charset="0"/>
-              </a:rPr>
-              <a:t>, </a:t>
-            </a:r>
-            <a:r>
-              <a:rPr kumimoji="0" lang="en-US" sz="2000" b="0" i="0" u="none" strike="noStrike" cap="none" normalizeH="0" baseline="0" dirty="0" err="1" smtClean="0">
-                <a:ln>
-                  <a:noFill/>
-                </a:ln>
-                <a:solidFill>
-                  <a:srgbClr val="0000FF"/>
-                </a:solidFill>
-                <a:effectLst/>
-                <a:latin typeface="Consolas" panose="020B0609020204030204" pitchFamily="49" charset="0"/>
-                <a:cs typeface="Consolas" panose="020B0609020204030204" pitchFamily="49" charset="0"/>
-              </a:rPr>
-              <a:t>int</a:t>
-            </a:r>
-            <a:r>
-              <a:rPr kumimoji="0" lang="en-US" sz="2000" b="0" i="0" u="none" strike="noStrike" cap="none" normalizeH="0" baseline="0" dirty="0" smtClean="0">
-                <a:ln>
-                  <a:noFill/>
-                </a:ln>
-                <a:solidFill>
-                  <a:srgbClr val="000000"/>
-                </a:solidFill>
-                <a:effectLst/>
-                <a:latin typeface="Consolas" panose="020B0609020204030204" pitchFamily="49" charset="0"/>
-                <a:cs typeface="Consolas" panose="020B0609020204030204" pitchFamily="49" charset="0"/>
-              </a:rPr>
-              <a:t>&gt;(501, 3001),</a:t>
-            </a:r>
-          </a:p>
-          <a:p>
-            <a:pPr marL="0" marR="0" lvl="0" indent="0" algn="l" defTabSz="914400" rtl="0" eaLnBrk="0" fontAlgn="base" latinLnBrk="0" hangingPunct="0">
-              <a:lnSpc>
-                <a:spcPct val="100000"/>
-              </a:lnSpc>
-              <a:spcBef>
-                <a:spcPct val="0"/>
-              </a:spcBef>
-              <a:spcAft>
-                <a:spcPct val="0"/>
-              </a:spcAft>
-              <a:buClrTx/>
-              <a:buSzTx/>
-              <a:buFontTx/>
-              <a:buNone/>
-              <a:tabLst/>
-            </a:pPr>
-            <a:r>
-              <a:rPr kumimoji="0" lang="en-US" sz="2000" b="0" i="0" u="none" strike="noStrike" cap="none" normalizeH="0" baseline="0" dirty="0" smtClean="0">
-                <a:ln>
-                  <a:noFill/>
-                </a:ln>
-                <a:solidFill>
-                  <a:srgbClr val="000000"/>
-                </a:solidFill>
-                <a:effectLst/>
-                <a:latin typeface="Consolas" panose="020B0609020204030204" pitchFamily="49" charset="0"/>
-                <a:cs typeface="Consolas" panose="020B0609020204030204" pitchFamily="49" charset="0"/>
-              </a:rPr>
-              <a:t>      (source, proxy) =&gt; </a:t>
-            </a:r>
-            <a:r>
-              <a:rPr kumimoji="0" lang="en-US" sz="2000" b="0" i="0" u="none" strike="noStrike" cap="none" normalizeH="0" baseline="0" dirty="0" err="1" smtClean="0">
-                <a:ln>
-                  <a:noFill/>
-                </a:ln>
-                <a:solidFill>
-                  <a:srgbClr val="000000"/>
-                </a:solidFill>
-                <a:effectLst/>
-                <a:latin typeface="Consolas" panose="020B0609020204030204" pitchFamily="49" charset="0"/>
-                <a:cs typeface="Consolas" panose="020B0609020204030204" pitchFamily="49" charset="0"/>
-              </a:rPr>
-              <a:t>proxy.SetState</a:t>
-            </a:r>
-            <a:r>
-              <a:rPr kumimoji="0" lang="en-US" sz="2000" b="0" i="0" u="none" strike="noStrike" cap="none" normalizeH="0" baseline="0" dirty="0" smtClean="0">
-                <a:ln>
-                  <a:noFill/>
-                </a:ln>
-                <a:solidFill>
-                  <a:srgbClr val="000000"/>
-                </a:solidFill>
-                <a:effectLst/>
-                <a:latin typeface="Consolas" panose="020B0609020204030204" pitchFamily="49" charset="0"/>
-                <a:cs typeface="Consolas" panose="020B0609020204030204" pitchFamily="49" charset="0"/>
-              </a:rPr>
-              <a:t>(source.Item1, source.Item2));</a:t>
-            </a:r>
-          </a:p>
-          <a:p>
-            <a:pPr marL="0" marR="0" lvl="0" indent="0" algn="l" defTabSz="914400" rtl="0" eaLnBrk="0" fontAlgn="base" latinLnBrk="0" hangingPunct="0">
-              <a:lnSpc>
-                <a:spcPct val="100000"/>
-              </a:lnSpc>
-              <a:spcBef>
-                <a:spcPct val="0"/>
-              </a:spcBef>
-              <a:spcAft>
-                <a:spcPct val="0"/>
-              </a:spcAft>
-              <a:buClrTx/>
-              <a:buSzTx/>
-              <a:buFontTx/>
-              <a:buNone/>
-              <a:tabLst/>
-            </a:pPr>
-            <a:endParaRPr lang="en-US" sz="2000" dirty="0" smtClean="0">
+              <a:t>foreach</a:t>
+            </a:r>
+            <a:endParaRPr lang="en-US" sz="3400" dirty="0" smtClean="0">
               <a:solidFill>
-                <a:srgbClr val="000000"/>
+                <a:srgbClr val="00B0F0"/>
               </a:solidFill>
-              <a:latin typeface="Consolas" panose="020B0609020204030204" pitchFamily="49" charset="0"/>
-              <a:cs typeface="Consolas" panose="020B0609020204030204" pitchFamily="49" charset="0"/>
             </a:endParaRPr>
           </a:p>
           <a:p>
-            <a:pPr eaLnBrk="0" fontAlgn="base" hangingPunct="0">
-              <a:spcBef>
-                <a:spcPct val="0"/>
-              </a:spcBef>
-              <a:spcAft>
-                <a:spcPct val="0"/>
-              </a:spcAft>
-            </a:pPr>
-            <a:r>
-              <a:rPr lang="en-US" sz="2000" dirty="0">
-                <a:solidFill>
-                  <a:srgbClr val="000000"/>
-                </a:solidFill>
-                <a:latin typeface="Consolas" panose="020B0609020204030204" pitchFamily="49" charset="0"/>
-                <a:cs typeface="Consolas" panose="020B0609020204030204" pitchFamily="49" charset="0"/>
-              </a:rPr>
-              <a:t>   </a:t>
-            </a:r>
-            <a:r>
-              <a:rPr lang="en-US" sz="2000" dirty="0" smtClean="0">
-                <a:solidFill>
-                  <a:srgbClr val="008000"/>
-                </a:solidFill>
-                <a:latin typeface="Consolas" panose="020B0609020204030204" pitchFamily="49" charset="0"/>
-                <a:cs typeface="Consolas" panose="020B0609020204030204" pitchFamily="49" charset="0"/>
-              </a:rPr>
-              <a:t>//think </a:t>
-            </a:r>
-            <a:r>
-              <a:rPr lang="en-US" sz="2000" dirty="0" err="1" smtClean="0">
-                <a:solidFill>
-                  <a:srgbClr val="008000"/>
-                </a:solidFill>
-                <a:latin typeface="Consolas" panose="020B0609020204030204" pitchFamily="49" charset="0"/>
-                <a:cs typeface="Consolas" panose="020B0609020204030204" pitchFamily="49" charset="0"/>
-              </a:rPr>
-              <a:t>Parallel.For</a:t>
-            </a:r>
-            <a:r>
-              <a:rPr lang="en-US" sz="2000" dirty="0" smtClean="0">
-                <a:solidFill>
-                  <a:srgbClr val="008000"/>
-                </a:solidFill>
-                <a:latin typeface="Consolas" panose="020B0609020204030204" pitchFamily="49" charset="0"/>
-                <a:cs typeface="Consolas" panose="020B0609020204030204" pitchFamily="49" charset="0"/>
-              </a:rPr>
-              <a:t> – (also has ForEach)</a:t>
-            </a:r>
-            <a:endParaRPr lang="en-US" sz="2000" dirty="0">
-              <a:solidFill>
-                <a:srgbClr val="008000"/>
-              </a:solidFill>
-              <a:latin typeface="Consolas" panose="020B0609020204030204" pitchFamily="49" charset="0"/>
-              <a:cs typeface="Consolas" panose="020B0609020204030204" pitchFamily="49" charset="0"/>
-            </a:endParaRPr>
-          </a:p>
-          <a:p>
-            <a:pPr marL="0" marR="0" lvl="0" indent="0" algn="l" defTabSz="914400" rtl="0" eaLnBrk="0" fontAlgn="base" latinLnBrk="0" hangingPunct="0">
-              <a:lnSpc>
-                <a:spcPct val="100000"/>
-              </a:lnSpc>
-              <a:spcBef>
-                <a:spcPct val="0"/>
-              </a:spcBef>
-              <a:spcAft>
-                <a:spcPct val="0"/>
-              </a:spcAft>
-              <a:buClrTx/>
-              <a:buSzTx/>
-              <a:buFontTx/>
-              <a:buNone/>
-              <a:tabLst/>
-            </a:pPr>
-            <a:r>
-              <a:rPr kumimoji="0" lang="en-US" sz="2000" b="0" i="0" u="none" strike="noStrike" cap="none" normalizeH="0" baseline="0" dirty="0" smtClean="0">
-                <a:ln>
-                  <a:noFill/>
-                </a:ln>
-                <a:solidFill>
-                  <a:srgbClr val="000000"/>
-                </a:solidFill>
-                <a:effectLst/>
-                <a:latin typeface="Consolas" panose="020B0609020204030204" pitchFamily="49" charset="0"/>
-                <a:cs typeface="Consolas" panose="020B0609020204030204" pitchFamily="49" charset="0"/>
-              </a:rPr>
-              <a:t>   </a:t>
-            </a:r>
-            <a:r>
-              <a:rPr kumimoji="0" lang="en-US" sz="2000" b="0" i="0" u="none" strike="noStrike" cap="none" normalizeH="0" baseline="0" dirty="0" err="1" smtClean="0">
-                <a:ln>
-                  <a:noFill/>
-                </a:ln>
-                <a:solidFill>
-                  <a:srgbClr val="0000FF"/>
-                </a:solidFill>
-                <a:effectLst/>
-                <a:latin typeface="Consolas" panose="020B0609020204030204" pitchFamily="49" charset="0"/>
-                <a:cs typeface="Consolas" panose="020B0609020204030204" pitchFamily="49" charset="0"/>
-              </a:rPr>
-              <a:t>var</a:t>
-            </a:r>
-            <a:r>
-              <a:rPr kumimoji="0" lang="en-US" sz="2000" b="0" i="0" u="none" strike="noStrike" cap="none" normalizeH="0" baseline="0" dirty="0" smtClean="0">
-                <a:ln>
-                  <a:noFill/>
-                </a:ln>
-                <a:solidFill>
-                  <a:srgbClr val="000000"/>
-                </a:solidFill>
-                <a:effectLst/>
-                <a:latin typeface="Consolas" panose="020B0609020204030204" pitchFamily="49" charset="0"/>
-                <a:cs typeface="Consolas" panose="020B0609020204030204" pitchFamily="49" charset="0"/>
-              </a:rPr>
-              <a:t> </a:t>
-            </a:r>
-            <a:r>
-              <a:rPr kumimoji="0" lang="en-US" sz="2000" b="0" i="0" u="none" strike="noStrike" cap="none" normalizeH="0" baseline="0" dirty="0" err="1" smtClean="0">
-                <a:ln>
-                  <a:noFill/>
-                </a:ln>
-                <a:solidFill>
-                  <a:srgbClr val="000000"/>
-                </a:solidFill>
-                <a:effectLst/>
-                <a:latin typeface="Consolas" panose="020B0609020204030204" pitchFamily="49" charset="0"/>
-                <a:cs typeface="Consolas" panose="020B0609020204030204" pitchFamily="49" charset="0"/>
-              </a:rPr>
-              <a:t>loopResult</a:t>
-            </a:r>
-            <a:r>
-              <a:rPr kumimoji="0" lang="en-US" sz="2000" b="0" i="0" u="none" strike="noStrike" cap="none" normalizeH="0" baseline="0" dirty="0" smtClean="0">
-                <a:ln>
-                  <a:noFill/>
-                </a:ln>
-                <a:solidFill>
-                  <a:srgbClr val="000000"/>
-                </a:solidFill>
-                <a:effectLst/>
-                <a:latin typeface="Consolas" panose="020B0609020204030204" pitchFamily="49" charset="0"/>
-                <a:cs typeface="Consolas" panose="020B0609020204030204" pitchFamily="49" charset="0"/>
-              </a:rPr>
-              <a:t> = </a:t>
-            </a:r>
-            <a:r>
-              <a:rPr kumimoji="0" lang="en-US" sz="2000" b="0" i="0" u="none" strike="noStrike" cap="none" normalizeH="0" baseline="0" dirty="0" err="1" smtClean="0">
-                <a:ln>
-                  <a:noFill/>
-                </a:ln>
-                <a:solidFill>
-                  <a:srgbClr val="000000"/>
-                </a:solidFill>
-                <a:effectLst/>
-                <a:latin typeface="Consolas" panose="020B0609020204030204" pitchFamily="49" charset="0"/>
-                <a:cs typeface="Consolas" panose="020B0609020204030204" pitchFamily="49" charset="0"/>
-              </a:rPr>
-              <a:t>client.For</a:t>
-            </a:r>
-            <a:r>
-              <a:rPr kumimoji="0" lang="en-US" sz="2000" b="0" i="0" u="none" strike="noStrike" cap="none" normalizeH="0" baseline="0" dirty="0" smtClean="0">
-                <a:ln>
-                  <a:noFill/>
-                </a:ln>
-                <a:solidFill>
-                  <a:srgbClr val="000000"/>
-                </a:solidFill>
-                <a:effectLst/>
-                <a:latin typeface="Consolas" panose="020B0609020204030204" pitchFamily="49" charset="0"/>
-                <a:cs typeface="Consolas" panose="020B0609020204030204" pitchFamily="49" charset="0"/>
-              </a:rPr>
-              <a:t>(0, 10,</a:t>
-            </a:r>
-          </a:p>
-          <a:p>
-            <a:pPr marL="0" marR="0" lvl="0" indent="0" algn="l" defTabSz="914400" rtl="0" eaLnBrk="0" fontAlgn="base" latinLnBrk="0" hangingPunct="0">
-              <a:lnSpc>
-                <a:spcPct val="100000"/>
-              </a:lnSpc>
-              <a:spcBef>
-                <a:spcPct val="0"/>
-              </a:spcBef>
-              <a:spcAft>
-                <a:spcPct val="0"/>
-              </a:spcAft>
-              <a:buClrTx/>
-              <a:buSzTx/>
-              <a:buFontTx/>
-              <a:buNone/>
-              <a:tabLst/>
-            </a:pPr>
-            <a:r>
-              <a:rPr kumimoji="0" lang="en-US" sz="2000" b="0" i="0" u="none" strike="noStrike" cap="none" normalizeH="0" baseline="0" dirty="0" smtClean="0">
-                <a:ln>
-                  <a:noFill/>
-                </a:ln>
-                <a:solidFill>
-                  <a:srgbClr val="000000"/>
-                </a:solidFill>
-                <a:effectLst/>
-                <a:latin typeface="Consolas" panose="020B0609020204030204" pitchFamily="49" charset="0"/>
-                <a:cs typeface="Consolas" panose="020B0609020204030204" pitchFamily="49" charset="0"/>
-              </a:rPr>
-              <a:t>      (index, proxy) =&gt; </a:t>
-            </a:r>
-            <a:r>
-              <a:rPr kumimoji="0" lang="en-US" sz="2000" b="0" i="0" u="none" strike="noStrike" cap="none" normalizeH="0" baseline="0" dirty="0" err="1" smtClean="0">
-                <a:ln>
-                  <a:noFill/>
-                </a:ln>
-                <a:solidFill>
-                  <a:srgbClr val="000000"/>
-                </a:solidFill>
-                <a:effectLst/>
-                <a:latin typeface="Consolas" panose="020B0609020204030204" pitchFamily="49" charset="0"/>
-                <a:cs typeface="Consolas" panose="020B0609020204030204" pitchFamily="49" charset="0"/>
-              </a:rPr>
-              <a:t>proxy.DoSomeWork</a:t>
-            </a:r>
-            <a:r>
-              <a:rPr kumimoji="0" lang="en-US" sz="2000" b="0" i="0" u="none" strike="noStrike" cap="none" normalizeH="0" baseline="0" dirty="0" smtClean="0">
-                <a:ln>
-                  <a:noFill/>
-                </a:ln>
-                <a:solidFill>
-                  <a:srgbClr val="000000"/>
-                </a:solidFill>
-                <a:effectLst/>
-                <a:latin typeface="Consolas" panose="020B0609020204030204" pitchFamily="49" charset="0"/>
-                <a:cs typeface="Consolas" panose="020B0609020204030204" pitchFamily="49" charset="0"/>
-              </a:rPr>
-              <a:t>(index));</a:t>
-            </a:r>
-          </a:p>
-          <a:p>
-            <a:pPr marL="0" marR="0" lvl="0" indent="0" algn="l" defTabSz="914400" rtl="0" eaLnBrk="0" fontAlgn="base" latinLnBrk="0" hangingPunct="0">
-              <a:lnSpc>
-                <a:spcPct val="100000"/>
-              </a:lnSpc>
-              <a:spcBef>
-                <a:spcPct val="0"/>
-              </a:spcBef>
-              <a:spcAft>
-                <a:spcPct val="0"/>
-              </a:spcAft>
-              <a:buClrTx/>
-              <a:buSzTx/>
-              <a:buFontTx/>
-              <a:buNone/>
-              <a:tabLst/>
-            </a:pPr>
-            <a:endParaRPr lang="en-US" sz="2000" dirty="0" smtClean="0">
-              <a:solidFill>
-                <a:srgbClr val="000000"/>
-              </a:solidFill>
-              <a:latin typeface="Consolas" panose="020B0609020204030204" pitchFamily="49" charset="0"/>
-              <a:cs typeface="Consolas" panose="020B0609020204030204" pitchFamily="49" charset="0"/>
-            </a:endParaRPr>
-          </a:p>
-          <a:p>
-            <a:pPr lvl="0" eaLnBrk="0" fontAlgn="base" hangingPunct="0">
-              <a:spcBef>
-                <a:spcPct val="0"/>
-              </a:spcBef>
-              <a:spcAft>
-                <a:spcPct val="0"/>
-              </a:spcAft>
-            </a:pPr>
-            <a:r>
-              <a:rPr lang="en-US" sz="2000" dirty="0">
-                <a:solidFill>
-                  <a:srgbClr val="000000"/>
-                </a:solidFill>
-                <a:latin typeface="Consolas" panose="020B0609020204030204" pitchFamily="49" charset="0"/>
-                <a:cs typeface="Consolas" panose="020B0609020204030204" pitchFamily="49" charset="0"/>
-              </a:rPr>
-              <a:t>   </a:t>
-            </a:r>
-            <a:r>
-              <a:rPr lang="en-US" sz="2000" dirty="0" err="1" smtClean="0">
-                <a:solidFill>
-                  <a:srgbClr val="0000FF"/>
-                </a:solidFill>
-                <a:latin typeface="Consolas" panose="020B0609020204030204" pitchFamily="49" charset="0"/>
-                <a:cs typeface="Consolas" panose="020B0609020204030204" pitchFamily="49" charset="0"/>
-              </a:rPr>
-              <a:t>var</a:t>
-            </a:r>
-            <a:r>
-              <a:rPr lang="en-US" sz="2000" dirty="0">
-                <a:solidFill>
-                  <a:srgbClr val="000000"/>
-                </a:solidFill>
-                <a:latin typeface="Consolas" panose="020B0609020204030204" pitchFamily="49" charset="0"/>
-                <a:cs typeface="Consolas" panose="020B0609020204030204" pitchFamily="49" charset="0"/>
-              </a:rPr>
-              <a:t> results = </a:t>
-            </a:r>
-            <a:r>
-              <a:rPr lang="en-US" sz="2000" dirty="0" err="1" smtClean="0">
-                <a:solidFill>
-                  <a:srgbClr val="000000"/>
-                </a:solidFill>
-                <a:latin typeface="Consolas" panose="020B0609020204030204" pitchFamily="49" charset="0"/>
-                <a:cs typeface="Consolas" panose="020B0609020204030204" pitchFamily="49" charset="0"/>
-              </a:rPr>
-              <a:t>loopResult.Results.ToArray</a:t>
-            </a:r>
-            <a:r>
-              <a:rPr lang="en-US" sz="2000" dirty="0">
-                <a:solidFill>
-                  <a:srgbClr val="000000"/>
-                </a:solidFill>
-                <a:latin typeface="Consolas" panose="020B0609020204030204" pitchFamily="49" charset="0"/>
-                <a:cs typeface="Consolas" panose="020B0609020204030204" pitchFamily="49" charset="0"/>
-              </a:rPr>
-              <a:t>();</a:t>
-            </a:r>
-          </a:p>
-          <a:p>
-            <a:pPr marL="0" marR="0" lvl="0" indent="0" algn="l" defTabSz="914400" rtl="0" eaLnBrk="0" fontAlgn="base" latinLnBrk="0" hangingPunct="0">
-              <a:lnSpc>
-                <a:spcPct val="100000"/>
-              </a:lnSpc>
-              <a:spcBef>
-                <a:spcPct val="0"/>
-              </a:spcBef>
-              <a:spcAft>
-                <a:spcPct val="0"/>
-              </a:spcAft>
-              <a:buClrTx/>
-              <a:buSzTx/>
-              <a:buFontTx/>
-              <a:buNone/>
-              <a:tabLst/>
-            </a:pPr>
-            <a:r>
-              <a:rPr lang="en-US" sz="2000" dirty="0" smtClean="0">
-                <a:solidFill>
-                  <a:srgbClr val="000000"/>
-                </a:solidFill>
-                <a:latin typeface="Consolas" panose="020B0609020204030204" pitchFamily="49" charset="0"/>
-                <a:cs typeface="Consolas" panose="020B0609020204030204" pitchFamily="49" charset="0"/>
-              </a:rPr>
-              <a:t>}</a:t>
-            </a:r>
-            <a:r>
-              <a:rPr kumimoji="0" lang="en-US" sz="2000" b="0" i="0" u="none" strike="noStrike" cap="none" normalizeH="0" baseline="0" dirty="0" smtClean="0">
-                <a:ln>
-                  <a:noFill/>
-                </a:ln>
-                <a:solidFill>
-                  <a:srgbClr val="000000"/>
-                </a:solidFill>
-                <a:effectLst/>
-                <a:latin typeface="Consolas" panose="020B0609020204030204" pitchFamily="49" charset="0"/>
-                <a:cs typeface="Consolas" panose="020B0609020204030204" pitchFamily="49" charset="0"/>
-              </a:rPr>
-              <a:t> </a:t>
-            </a:r>
-            <a:endParaRPr kumimoji="0" lang="en-US" sz="4400" b="0" i="0" u="none" strike="noStrike" cap="none" normalizeH="0" baseline="0" dirty="0" smtClean="0">
-              <a:ln>
-                <a:noFill/>
-              </a:ln>
-              <a:solidFill>
-                <a:schemeClr val="tx1"/>
-              </a:solidFill>
-              <a:effectLst/>
-              <a:latin typeface="Arial" panose="020B0604020202020204" pitchFamily="34" charset="0"/>
-            </a:endParaRPr>
+            <a:pPr lvl="1"/>
+            <a:r>
+              <a:rPr lang="en-US" sz="3200" dirty="0" smtClean="0"/>
+              <a:t>Get and write results for each</a:t>
+            </a:r>
+            <a:endParaRPr lang="en-US" sz="3200" dirty="0" smtClean="0"/>
           </a:p>
         </p:txBody>
       </p:sp>
     </p:spTree>
     <p:extLst>
       <p:ext uri="{BB962C8B-B14F-4D97-AF65-F5344CB8AC3E}">
-        <p14:creationId xmlns:p14="http://schemas.microsoft.com/office/powerpoint/2010/main" val="3102145847"/>
+        <p14:creationId xmlns:p14="http://schemas.microsoft.com/office/powerpoint/2010/main" val="2732334037"/>
       </p:ext>
     </p:extLst>
   </p:cSld>
@@ -9406,7 +7084,11 @@
             </a:r>
             <a:r>
               <a:rPr lang="en-US" sz="4000" dirty="0" err="1" smtClean="0"/>
-              <a:t>.DistributedFeatures</a:t>
+              <a:t>.DoSprint</a:t>
+            </a:r>
+            <a:r>
+              <a:rPr lang="en-US" sz="4000" dirty="0" smtClean="0"/>
+              <a:t>(3)</a:t>
             </a:r>
             <a:endParaRPr sz="4000" dirty="0"/>
           </a:p>
@@ -9425,55 +7107,62 @@
         <p:spPr/>
         <p:txBody>
           <a:bodyPr>
-            <a:normAutofit/>
+            <a:normAutofit lnSpcReduction="10000"/>
           </a:bodyPr>
           <a:lstStyle/>
           <a:p>
             <a:r>
               <a:rPr lang="en-US" sz="3600" dirty="0" smtClean="0"/>
-              <a:t>TPL look and feel (simplified)</a:t>
+              <a:t>As a boss</a:t>
+            </a:r>
+          </a:p>
+          <a:p>
+            <a:r>
+              <a:rPr lang="en-US" sz="3600" dirty="0" smtClean="0"/>
+              <a:t>I want the same performance data </a:t>
             </a:r>
           </a:p>
           <a:p>
             <a:pPr lvl="1"/>
             <a:r>
               <a:rPr lang="en-US" sz="3400" dirty="0" smtClean="0"/>
-              <a:t>For and ForEach</a:t>
+              <a:t>on 10 web pages</a:t>
+            </a:r>
+          </a:p>
+          <a:p>
+            <a:pPr lvl="1"/>
+            <a:r>
+              <a:rPr lang="en-US" sz="3400" dirty="0" smtClean="0"/>
+              <a:t>at the same time (in parallel)</a:t>
             </a:r>
           </a:p>
           <a:p>
             <a:r>
               <a:rPr lang="en-US" sz="3600" dirty="0" smtClean="0"/>
-              <a:t>Runtime deployment</a:t>
-            </a:r>
-          </a:p>
-          <a:p>
-            <a:r>
-              <a:rPr lang="en-US" sz="3600" dirty="0" smtClean="0"/>
-              <a:t>Logging</a:t>
-            </a:r>
-          </a:p>
-          <a:p>
-            <a:r>
-              <a:rPr lang="en-US" sz="3600" dirty="0" smtClean="0"/>
-              <a:t>Single assembly (one NuGet package)</a:t>
-            </a:r>
-          </a:p>
-          <a:p>
-            <a:r>
-              <a:rPr lang="en-US" sz="3600" dirty="0" smtClean="0"/>
-              <a:t>Host in any console or Windows Service</a:t>
-            </a:r>
-          </a:p>
-          <a:p>
-            <a:endParaRPr lang="en-US" sz="3600" dirty="0" smtClean="0"/>
+              <a:t>So that I can make some charts and graphs</a:t>
+            </a:r>
+          </a:p>
+          <a:p>
+            <a:pPr lvl="1"/>
+            <a:r>
+              <a:rPr lang="en-US" sz="3400" dirty="0" smtClean="0"/>
+              <a:t>That appear in real time, and</a:t>
+            </a:r>
+          </a:p>
+          <a:p>
+            <a:pPr lvl="1"/>
+            <a:r>
+              <a:rPr lang="en-US" sz="3400" dirty="0" smtClean="0"/>
+              <a:t>That will get me that promotion</a:t>
+            </a:r>
+            <a:endParaRPr lang="en-US" sz="3400" dirty="0"/>
           </a:p>
         </p:txBody>
       </p:sp>
     </p:spTree>
     <p:extLst>
       <p:ext uri="{BB962C8B-B14F-4D97-AF65-F5344CB8AC3E}">
-        <p14:creationId xmlns:p14="http://schemas.microsoft.com/office/powerpoint/2010/main" val="4040592701"/>
+        <p14:creationId xmlns:p14="http://schemas.microsoft.com/office/powerpoint/2010/main" val="457696742"/>
       </p:ext>
     </p:extLst>
   </p:cSld>
@@ -9542,7 +7231,19 @@
             </a:r>
             <a:r>
               <a:rPr lang="en-US" sz="4000" dirty="0" err="1" smtClean="0"/>
-              <a:t>.DistributedLimitations</a:t>
+              <a:t>.GoTo</a:t>
+            </a:r>
+            <a:r>
+              <a:rPr lang="en-US" sz="4000" dirty="0" smtClean="0"/>
+              <a:t>(</a:t>
+            </a:r>
+            <a:r>
+              <a:rPr lang="en-US" sz="4000" dirty="0" err="1" smtClean="0"/>
+              <a:t>VisualStudio</a:t>
+            </a:r>
+            <a:r>
+              <a:rPr lang="en-US" sz="4000" dirty="0" smtClean="0"/>
+              <a:t>)</a:t>
             </a:r>
             <a:endParaRPr sz="4000" dirty="0"/>
           </a:p>
@@ -9558,12 +7259,7 @@
             <p:ph idx="1"/>
           </p:nvPr>
         </p:nvSpPr>
-        <p:spPr>
-          <a:xfrm>
-            <a:off x="1524000" y="1828800"/>
-            <a:ext cx="9982200" cy="4267200"/>
-          </a:xfrm>
-        </p:spPr>
+        <p:spPr/>
         <p:txBody>
           <a:bodyPr>
             <a:normAutofit/>
@@ -9571,63 +7267,41 @@
           <a:lstStyle/>
           <a:p>
             <a:r>
-              <a:rPr lang="en-US" sz="3600" dirty="0" smtClean="0"/>
-              <a:t>State per node (not shared)</a:t>
-            </a:r>
-          </a:p>
-          <a:p>
-            <a:r>
-              <a:rPr lang="en-US" sz="3600" dirty="0" smtClean="0"/>
-              <a:t>Parameters must be [</a:t>
-            </a:r>
-            <a:r>
-              <a:rPr lang="en-US" sz="3600" dirty="0" smtClean="0">
+              <a:rPr lang="en-US" sz="3400" dirty="0" smtClean="0"/>
+              <a:t>Convert </a:t>
+            </a:r>
+            <a:r>
+              <a:rPr lang="en-US" sz="3400" dirty="0" err="1" smtClean="0">
                 <a:solidFill>
                   <a:srgbClr val="00B0F0"/>
                 </a:solidFill>
               </a:rPr>
-              <a:t>Serializable</a:t>
-            </a:r>
-            <a:r>
-              <a:rPr lang="en-US" sz="3600" dirty="0" smtClean="0"/>
-              <a:t>]</a:t>
-            </a:r>
-          </a:p>
-          <a:p>
-            <a:r>
-              <a:rPr lang="en-US" sz="3600" dirty="0" smtClean="0"/>
-              <a:t>IEnumerable&lt;T&gt; and yield return not supported</a:t>
-            </a:r>
-          </a:p>
-          <a:p>
-            <a:r>
-              <a:rPr lang="en-US" sz="3600" dirty="0" smtClean="0"/>
-              <a:t>Socket open per call</a:t>
-            </a:r>
-          </a:p>
-          <a:p>
-            <a:r>
-              <a:rPr lang="en-US" sz="3600" dirty="0" smtClean="0"/>
-              <a:t>ForEach Partioner </a:t>
-            </a:r>
-            <a:r>
-              <a:rPr lang="en-US" sz="3600" dirty="0"/>
-              <a:t>not supported </a:t>
-            </a:r>
-            <a:endParaRPr lang="en-US" sz="3600" dirty="0" smtClean="0"/>
-          </a:p>
-          <a:p>
-            <a:r>
-              <a:rPr lang="en-US" sz="3600" dirty="0" smtClean="0"/>
-              <a:t>Single subscription strategy</a:t>
-            </a:r>
+              <a:t>foreach</a:t>
+            </a:r>
+            <a:r>
+              <a:rPr lang="en-US" sz="3200" dirty="0" smtClean="0"/>
+              <a:t> to </a:t>
+            </a:r>
+            <a:r>
+              <a:rPr lang="en-US" sz="3200" dirty="0" err="1" smtClean="0">
+                <a:solidFill>
+                  <a:srgbClr val="00B0F0"/>
+                </a:solidFill>
+              </a:rPr>
+              <a:t>Parallel.ForEach</a:t>
+            </a:r>
+            <a:endParaRPr lang="en-US" sz="3200" dirty="0">
+              <a:solidFill>
+                <a:srgbClr val="00B0F0"/>
+              </a:solidFill>
+            </a:endParaRPr>
           </a:p>
         </p:txBody>
       </p:sp>
     </p:spTree>
     <p:extLst>
       <p:ext uri="{BB962C8B-B14F-4D97-AF65-F5344CB8AC3E}">
-        <p14:creationId xmlns:p14="http://schemas.microsoft.com/office/powerpoint/2010/main" val="1333505284"/>
+        <p14:creationId xmlns:p14="http://schemas.microsoft.com/office/powerpoint/2010/main" val="4030604947"/>
       </p:ext>
     </p:extLst>
   </p:cSld>

</xml_diff>